<commit_message>
Doc (presentation): add final presentation
</commit_message>
<xml_diff>
--- a/presentation/tradeoffs_biots2016.pptx
+++ b/presentation/tradeoffs_biots2016.pptx
@@ -128,7 +128,7 @@
   </p:defaultTextStyle>
   <p:extLst>
     <p:ext uri="{EFAFB233-063F-42B5-8137-9DF3F51BA10A}">
-      <p15:sldGuideLst xmlns:p15="http://schemas.microsoft.com/office/powerpoint/2012/main">
+      <p15:sldGuideLst xmlns:p15="http://schemas.microsoft.com/office/powerpoint/2012/main" xmlns="">
         <p15:guide id="1" orient="horz" pos="391">
           <p15:clr>
             <a:srgbClr val="A4A3A4"/>
@@ -197,7 +197,7 @@
       </p15:sldGuideLst>
     </p:ext>
     <p:ext uri="{2D200454-40CA-4A62-9FC3-DE9A4176ACB9}">
-      <p15:notesGuideLst xmlns:p15="http://schemas.microsoft.com/office/powerpoint/2012/main">
+      <p15:notesGuideLst xmlns:p15="http://schemas.microsoft.com/office/powerpoint/2012/main" xmlns="">
         <p15:guide id="1" orient="horz" pos="2236">
           <p15:clr>
             <a:srgbClr val="A4A3A4"/>
@@ -300,7 +300,7 @@
               <a:rPr lang="de-DE" smtClean="0">
                 <a:latin typeface="Arial" panose="020B0604020202020204" pitchFamily="34" charset="0"/>
               </a:rPr>
-              <a:t>09.09.2016</a:t>
+              <a:t>09.09.16</a:t>
             </a:fld>
             <a:endParaRPr lang="de-DE" dirty="0">
               <a:latin typeface="Arial" panose="020B0604020202020204" pitchFamily="34" charset="0"/>
@@ -372,7 +372,7 @@
               <a:rPr lang="de-DE" smtClean="0">
                 <a:latin typeface="Arial" panose="020B0604020202020204" pitchFamily="34" charset="0"/>
               </a:rPr>
-              <a:t>‹Nr.›</a:t>
+              <a:t>‹#›</a:t>
             </a:fld>
             <a:endParaRPr lang="de-DE" dirty="0">
               <a:latin typeface="Arial" panose="020B0604020202020204" pitchFamily="34" charset="0"/>
@@ -479,7 +479,7 @@
             <a:fld id="{BCDB334D-D17F-49C4-91DD-37BB7E818209}" type="datetimeFigureOut">
               <a:rPr lang="de-CH" smtClean="0"/>
               <a:pPr/>
-              <a:t>09.09.2016</a:t>
+              <a:t>09.09.16</a:t>
             </a:fld>
             <a:endParaRPr lang="de-CH" dirty="0"/>
           </a:p>
@@ -643,7 +643,7 @@
             <a:fld id="{A51C0C35-A9A2-4EFD-9BAF-1E52E29E03D1}" type="slidenum">
               <a:rPr lang="de-CH" smtClean="0"/>
               <a:pPr/>
-              <a:t>‹Nr.›</a:t>
+              <a:t>‹#›</a:t>
             </a:fld>
             <a:endParaRPr lang="de-CH" dirty="0"/>
           </a:p>
@@ -1011,7 +1011,7 @@
           <a:p>
             <a:fld id="{BA1DC4A7-2E97-6F4B-99A9-B8D8BFAC4E2C}" type="datetime1">
               <a:rPr lang="gsw-FR" smtClean="0"/>
-              <a:t>09/09/2016</a:t>
+              <a:t>09.09.16</a:t>
             </a:fld>
             <a:endParaRPr lang="en-GB" dirty="0"/>
           </a:p>
@@ -1034,7 +1034,7 @@
           <a:p>
             <a:fld id="{6C6AE60A-B69C-4790-82F7-3882EDF23186}" type="slidenum">
               <a:rPr lang="en-GB" smtClean="0"/>
-              <a:t>‹Nr.›</a:t>
+              <a:t>‹#›</a:t>
             </a:fld>
             <a:endParaRPr lang="en-GB" dirty="0"/>
           </a:p>
@@ -1150,13 +1150,13 @@
   <p:clrMapOvr>
     <a:masterClrMapping/>
   </p:clrMapOvr>
-  <p:transition>
+  <p:transition xmlns:p14="http://schemas.microsoft.com/office/powerpoint/2010/main">
     <p:fade/>
   </p:transition>
   <p:timing>
     <p:tnLst>
       <p:par>
-        <p:cTn id="1" dur="indefinite" restart="never" nodeType="tmRoot"/>
+        <p:cTn xmlns:p14="http://schemas.microsoft.com/office/powerpoint/2010/main" id="1" dur="indefinite" restart="never" nodeType="tmRoot"/>
       </p:par>
     </p:tnLst>
   </p:timing>
@@ -1320,7 +1320,7 @@
           <a:p>
             <a:fld id="{9E49D235-49EC-DA4D-AE0A-1F2AA14B7FE9}" type="datetime1">
               <a:rPr lang="gsw-FR" smtClean="0"/>
-              <a:t>09/09/2016</a:t>
+              <a:t>09.09.16</a:t>
             </a:fld>
             <a:endParaRPr lang="en-GB" dirty="0"/>
           </a:p>
@@ -1343,7 +1343,7 @@
           <a:p>
             <a:fld id="{6C6AE60A-B69C-4790-82F7-3882EDF23186}" type="slidenum">
               <a:rPr lang="en-GB" smtClean="0"/>
-              <a:t>‹Nr.›</a:t>
+              <a:t>‹#›</a:t>
             </a:fld>
             <a:endParaRPr lang="en-GB" dirty="0"/>
           </a:p>
@@ -1451,13 +1451,13 @@
   <p:clrMapOvr>
     <a:masterClrMapping/>
   </p:clrMapOvr>
-  <p:transition>
+  <p:transition xmlns:p14="http://schemas.microsoft.com/office/powerpoint/2010/main">
     <p:fade/>
   </p:transition>
   <p:timing>
     <p:tnLst>
       <p:par>
-        <p:cTn id="1" dur="indefinite" restart="never" nodeType="tmRoot"/>
+        <p:cTn xmlns:p14="http://schemas.microsoft.com/office/powerpoint/2010/main" id="1" dur="indefinite" restart="never" nodeType="tmRoot"/>
       </p:par>
     </p:tnLst>
   </p:timing>
@@ -1668,7 +1668,7 @@
           <a:p>
             <a:fld id="{D48BB3A1-0256-2543-9542-9F9CC20A3AD3}" type="datetime1">
               <a:rPr lang="gsw-FR" smtClean="0"/>
-              <a:t>09/09/2016</a:t>
+              <a:t>09.09.16</a:t>
             </a:fld>
             <a:endParaRPr lang="en-GB" dirty="0"/>
           </a:p>
@@ -1714,7 +1714,7 @@
           <a:p>
             <a:fld id="{6C6AE60A-B69C-4790-82F7-3882EDF23186}" type="slidenum">
               <a:rPr lang="en-GB" smtClean="0"/>
-              <a:t>‹Nr.›</a:t>
+              <a:t>‹#›</a:t>
             </a:fld>
             <a:endParaRPr lang="en-GB" dirty="0"/>
           </a:p>
@@ -1763,13 +1763,13 @@
   <p:clrMapOvr>
     <a:masterClrMapping/>
   </p:clrMapOvr>
-  <p:transition>
+  <p:transition xmlns:p14="http://schemas.microsoft.com/office/powerpoint/2010/main">
     <p:fade/>
   </p:transition>
   <p:timing>
     <p:tnLst>
       <p:par>
-        <p:cTn id="1" dur="indefinite" restart="never" nodeType="tmRoot"/>
+        <p:cTn xmlns:p14="http://schemas.microsoft.com/office/powerpoint/2010/main" id="1" dur="indefinite" restart="never" nodeType="tmRoot"/>
       </p:par>
     </p:tnLst>
   </p:timing>
@@ -1976,7 +1976,7 @@
           <a:p>
             <a:fld id="{E931FA40-2C90-5E47-AC80-DF5083978FA1}" type="datetime1">
               <a:rPr lang="gsw-FR" smtClean="0"/>
-              <a:t>09/09/2016</a:t>
+              <a:t>09.09.16</a:t>
             </a:fld>
             <a:endParaRPr lang="en-GB" dirty="0"/>
           </a:p>
@@ -2022,7 +2022,7 @@
           <a:p>
             <a:fld id="{6C6AE60A-B69C-4790-82F7-3882EDF23186}" type="slidenum">
               <a:rPr lang="en-GB" smtClean="0"/>
-              <a:t>‹Nr.›</a:t>
+              <a:t>‹#›</a:t>
             </a:fld>
             <a:endParaRPr lang="en-GB" dirty="0"/>
           </a:p>
@@ -2071,19 +2071,19 @@
   <p:clrMapOvr>
     <a:masterClrMapping/>
   </p:clrMapOvr>
-  <p:transition>
+  <p:transition xmlns:p14="http://schemas.microsoft.com/office/powerpoint/2010/main">
     <p:fade/>
   </p:transition>
   <p:timing>
     <p:tnLst>
       <p:par>
-        <p:cTn id="1" dur="indefinite" restart="never" nodeType="tmRoot"/>
+        <p:cTn xmlns:p14="http://schemas.microsoft.com/office/powerpoint/2010/main" id="1" dur="indefinite" restart="never" nodeType="tmRoot"/>
       </p:par>
     </p:tnLst>
   </p:timing>
   <p:extLst mod="1">
     <p:ext uri="{DCECCB84-F9BA-43D5-87BE-67443E8EF086}">
-      <p15:sldGuideLst xmlns:p15="http://schemas.microsoft.com/office/powerpoint/2012/main"/>
+      <p15:sldGuideLst xmlns:p15="http://schemas.microsoft.com/office/powerpoint/2012/main" xmlns=""/>
     </p:ext>
   </p:extLst>
 </p:sldLayout>
@@ -3117,13 +3117,13 @@
   <p:clrMapOvr>
     <a:masterClrMapping/>
   </p:clrMapOvr>
-  <p:transition>
+  <p:transition xmlns:p14="http://schemas.microsoft.com/office/powerpoint/2010/main">
     <p:fade/>
   </p:transition>
   <p:timing>
     <p:tnLst>
       <p:par>
-        <p:cTn id="1" dur="indefinite" restart="never" nodeType="tmRoot"/>
+        <p:cTn xmlns:p14="http://schemas.microsoft.com/office/powerpoint/2010/main" id="1" dur="indefinite" restart="never" nodeType="tmRoot"/>
       </p:par>
     </p:tnLst>
   </p:timing>
@@ -3269,7 +3269,7 @@
           <a:p>
             <a:fld id="{B3F57A6A-C5B6-BC45-B6F0-579F0D9FEFA6}" type="datetime1">
               <a:rPr lang="gsw-FR" smtClean="0"/>
-              <a:t>09/09/2016</a:t>
+              <a:t>09.09.16</a:t>
             </a:fld>
             <a:endParaRPr lang="en-GB" dirty="0"/>
           </a:p>
@@ -3315,7 +3315,7 @@
           <a:p>
             <a:fld id="{6C6AE60A-B69C-4790-82F7-3882EDF23186}" type="slidenum">
               <a:rPr lang="en-GB" smtClean="0"/>
-              <a:t>‹Nr.›</a:t>
+              <a:t>‹#›</a:t>
             </a:fld>
             <a:endParaRPr lang="en-GB" dirty="0"/>
           </a:p>
@@ -3366,13 +3366,13 @@
   <p:clrMapOvr>
     <a:masterClrMapping/>
   </p:clrMapOvr>
-  <p:transition>
+  <p:transition xmlns:p14="http://schemas.microsoft.com/office/powerpoint/2010/main">
     <p:fade/>
   </p:transition>
   <p:timing>
     <p:tnLst>
       <p:par>
-        <p:cTn id="1" dur="indefinite" restart="never" nodeType="tmRoot"/>
+        <p:cTn xmlns:p14="http://schemas.microsoft.com/office/powerpoint/2010/main" id="1" dur="indefinite" restart="never" nodeType="tmRoot"/>
       </p:par>
     </p:tnLst>
   </p:timing>
@@ -3687,7 +3687,7 @@
           <a:p>
             <a:fld id="{E3A70E77-8377-DE47-B714-DACAC19DB7E2}" type="datetime1">
               <a:rPr lang="gsw-FR" smtClean="0"/>
-              <a:t>09/09/2016</a:t>
+              <a:t>09.09.16</a:t>
             </a:fld>
             <a:endParaRPr lang="en-GB" dirty="0"/>
           </a:p>
@@ -3733,7 +3733,7 @@
           <a:p>
             <a:fld id="{6C6AE60A-B69C-4790-82F7-3882EDF23186}" type="slidenum">
               <a:rPr lang="en-GB" smtClean="0"/>
-              <a:t>‹Nr.›</a:t>
+              <a:t>‹#›</a:t>
             </a:fld>
             <a:endParaRPr lang="en-GB" dirty="0"/>
           </a:p>
@@ -3784,13 +3784,13 @@
   <p:clrMapOvr>
     <a:masterClrMapping/>
   </p:clrMapOvr>
-  <p:transition>
+  <p:transition xmlns:p14="http://schemas.microsoft.com/office/powerpoint/2010/main">
     <p:fade/>
   </p:transition>
   <p:timing>
     <p:tnLst>
       <p:par>
-        <p:cTn id="1" dur="indefinite" restart="never" nodeType="tmRoot"/>
+        <p:cTn xmlns:p14="http://schemas.microsoft.com/office/powerpoint/2010/main" id="1" dur="indefinite" restart="never" nodeType="tmRoot"/>
       </p:par>
     </p:tnLst>
   </p:timing>
@@ -3831,7 +3831,7 @@
           <a:p>
             <a:fld id="{F3705DAF-A6F4-3945-97F1-F85A649BF978}" type="datetime1">
               <a:rPr lang="gsw-FR" smtClean="0"/>
-              <a:t>09/09/2016</a:t>
+              <a:t>09.09.16</a:t>
             </a:fld>
             <a:endParaRPr lang="en-GB" dirty="0"/>
           </a:p>
@@ -3877,7 +3877,7 @@
           <a:p>
             <a:fld id="{6C6AE60A-B69C-4790-82F7-3882EDF23186}" type="slidenum">
               <a:rPr lang="en-GB" smtClean="0"/>
-              <a:t>‹Nr.›</a:t>
+              <a:t>‹#›</a:t>
             </a:fld>
             <a:endParaRPr lang="en-GB" dirty="0"/>
           </a:p>
@@ -3925,13 +3925,13 @@
   <p:clrMapOvr>
     <a:masterClrMapping/>
   </p:clrMapOvr>
-  <p:transition>
+  <p:transition xmlns:p14="http://schemas.microsoft.com/office/powerpoint/2010/main">
     <p:fade/>
   </p:transition>
   <p:timing>
     <p:tnLst>
       <p:par>
-        <p:cTn id="1" dur="indefinite" restart="never" nodeType="tmRoot"/>
+        <p:cTn xmlns:p14="http://schemas.microsoft.com/office/powerpoint/2010/main" id="1" dur="indefinite" restart="never" nodeType="tmRoot"/>
       </p:par>
     </p:tnLst>
   </p:timing>
@@ -3972,7 +3972,7 @@
           <a:p>
             <a:fld id="{C92B5E08-6169-3D4E-990F-FE49BB56EA30}" type="datetime1">
               <a:rPr lang="gsw-FR" smtClean="0"/>
-              <a:t>09/09/2016</a:t>
+              <a:t>09.09.16</a:t>
             </a:fld>
             <a:endParaRPr lang="en-GB" dirty="0"/>
           </a:p>
@@ -4018,7 +4018,7 @@
           <a:p>
             <a:fld id="{6C6AE60A-B69C-4790-82F7-3882EDF23186}" type="slidenum">
               <a:rPr lang="en-GB" smtClean="0"/>
-              <a:t>‹Nr.›</a:t>
+              <a:t>‹#›</a:t>
             </a:fld>
             <a:endParaRPr lang="en-GB" dirty="0"/>
           </a:p>
@@ -4067,13 +4067,13 @@
   <p:clrMapOvr>
     <a:masterClrMapping/>
   </p:clrMapOvr>
-  <p:transition>
+  <p:transition xmlns:p14="http://schemas.microsoft.com/office/powerpoint/2010/main">
     <p:fade/>
   </p:transition>
   <p:timing>
     <p:tnLst>
       <p:par>
-        <p:cTn id="1" dur="indefinite" restart="never" nodeType="tmRoot"/>
+        <p:cTn xmlns:p14="http://schemas.microsoft.com/office/powerpoint/2010/main" id="1" dur="indefinite" restart="never" nodeType="tmRoot"/>
       </p:par>
     </p:tnLst>
   </p:timing>
@@ -4160,7 +4160,7 @@
           <a:p>
             <a:fld id="{1850A8C9-024B-3A42-8350-AB85718EB314}" type="datetime1">
               <a:rPr lang="gsw-FR" smtClean="0"/>
-              <a:t>09/09/2016</a:t>
+              <a:t>09.09.16</a:t>
             </a:fld>
             <a:endParaRPr lang="en-GB" dirty="0"/>
           </a:p>
@@ -4206,7 +4206,7 @@
           <a:p>
             <a:fld id="{6C6AE60A-B69C-4790-82F7-3882EDF23186}" type="slidenum">
               <a:rPr lang="en-GB" smtClean="0"/>
-              <a:t>‹Nr.›</a:t>
+              <a:t>‹#›</a:t>
             </a:fld>
             <a:endParaRPr lang="en-GB" dirty="0"/>
           </a:p>
@@ -4252,13 +4252,13 @@
   <p:clrMapOvr>
     <a:masterClrMapping/>
   </p:clrMapOvr>
-  <p:transition>
+  <p:transition xmlns:p14="http://schemas.microsoft.com/office/powerpoint/2010/main">
     <p:fade/>
   </p:transition>
   <p:timing>
     <p:tnLst>
       <p:par>
-        <p:cTn id="1" dur="indefinite" restart="never" nodeType="tmRoot"/>
+        <p:cTn xmlns:p14="http://schemas.microsoft.com/office/powerpoint/2010/main" id="1" dur="indefinite" restart="never" nodeType="tmRoot"/>
       </p:par>
     </p:tnLst>
   </p:timing>
@@ -4422,7 +4422,7 @@
           <a:p>
             <a:fld id="{F46734AB-8EC7-B342-8E7B-BC1F29D066BD}" type="datetime1">
               <a:rPr lang="gsw-FR" smtClean="0"/>
-              <a:t>09/09/2016</a:t>
+              <a:t>09.09.16</a:t>
             </a:fld>
             <a:endParaRPr lang="en-GB" dirty="0"/>
           </a:p>
@@ -4445,7 +4445,7 @@
           <a:p>
             <a:fld id="{6C6AE60A-B69C-4790-82F7-3882EDF23186}" type="slidenum">
               <a:rPr lang="en-GB" smtClean="0"/>
-              <a:t>‹Nr.›</a:t>
+              <a:t>‹#›</a:t>
             </a:fld>
             <a:endParaRPr lang="en-GB" dirty="0"/>
           </a:p>
@@ -4553,13 +4553,13 @@
   <p:clrMapOvr>
     <a:masterClrMapping/>
   </p:clrMapOvr>
-  <p:transition>
+  <p:transition xmlns:p14="http://schemas.microsoft.com/office/powerpoint/2010/main">
     <p:fade/>
   </p:transition>
   <p:timing>
     <p:tnLst>
       <p:par>
-        <p:cTn id="1" dur="indefinite" restart="never" nodeType="tmRoot"/>
+        <p:cTn xmlns:p14="http://schemas.microsoft.com/office/powerpoint/2010/main" id="1" dur="indefinite" restart="never" nodeType="tmRoot"/>
       </p:par>
     </p:tnLst>
   </p:timing>
@@ -4770,7 +4770,7 @@
           <a:p>
             <a:fld id="{AF5AB211-7CD7-AE4A-A96D-C1B6E40A4A88}" type="datetime1">
               <a:rPr lang="gsw-FR" smtClean="0"/>
-              <a:t>09/09/2016</a:t>
+              <a:t>09.09.16</a:t>
             </a:fld>
             <a:endParaRPr lang="en-GB" dirty="0"/>
           </a:p>
@@ -4816,7 +4816,7 @@
           <a:p>
             <a:fld id="{6C6AE60A-B69C-4790-82F7-3882EDF23186}" type="slidenum">
               <a:rPr lang="en-GB" smtClean="0"/>
-              <a:t>‹Nr.›</a:t>
+              <a:t>‹#›</a:t>
             </a:fld>
             <a:endParaRPr lang="en-GB" dirty="0"/>
           </a:p>
@@ -4865,13 +4865,13 @@
   <p:clrMapOvr>
     <a:masterClrMapping/>
   </p:clrMapOvr>
-  <p:transition>
+  <p:transition xmlns:p14="http://schemas.microsoft.com/office/powerpoint/2010/main">
     <p:fade/>
   </p:transition>
   <p:timing>
     <p:tnLst>
       <p:par>
-        <p:cTn id="1" dur="indefinite" restart="never" nodeType="tmRoot"/>
+        <p:cTn xmlns:p14="http://schemas.microsoft.com/office/powerpoint/2010/main" id="1" dur="indefinite" restart="never" nodeType="tmRoot"/>
       </p:par>
     </p:tnLst>
   </p:timing>
@@ -5082,7 +5082,7 @@
           <a:p>
             <a:fld id="{6664DCE2-B537-9E4E-B206-F0F5AA063386}" type="datetime1">
               <a:rPr lang="gsw-FR" smtClean="0"/>
-              <a:t>09/09/2016</a:t>
+              <a:t>09.09.16</a:t>
             </a:fld>
             <a:endParaRPr lang="en-GB" dirty="0"/>
           </a:p>
@@ -5128,7 +5128,7 @@
           <a:p>
             <a:fld id="{6C6AE60A-B69C-4790-82F7-3882EDF23186}" type="slidenum">
               <a:rPr lang="en-GB" smtClean="0"/>
-              <a:t>‹Nr.›</a:t>
+              <a:t>‹#›</a:t>
             </a:fld>
             <a:endParaRPr lang="en-GB" dirty="0"/>
           </a:p>
@@ -5177,13 +5177,13 @@
   <p:clrMapOvr>
     <a:masterClrMapping/>
   </p:clrMapOvr>
-  <p:transition>
+  <p:transition xmlns:p14="http://schemas.microsoft.com/office/powerpoint/2010/main">
     <p:fade/>
   </p:transition>
   <p:timing>
     <p:tnLst>
       <p:par>
-        <p:cTn id="1" dur="indefinite" restart="never" nodeType="tmRoot"/>
+        <p:cTn xmlns:p14="http://schemas.microsoft.com/office/powerpoint/2010/main" id="1" dur="indefinite" restart="never" nodeType="tmRoot"/>
       </p:par>
     </p:tnLst>
   </p:timing>
@@ -5390,7 +5390,7 @@
           <a:p>
             <a:fld id="{2F0F7097-D34F-8B4B-A71C-2EF240BAE60C}" type="datetime1">
               <a:rPr lang="gsw-FR" smtClean="0"/>
-              <a:t>09/09/2016</a:t>
+              <a:t>09.09.16</a:t>
             </a:fld>
             <a:endParaRPr lang="en-GB" dirty="0"/>
           </a:p>
@@ -5436,7 +5436,7 @@
           <a:p>
             <a:fld id="{6C6AE60A-B69C-4790-82F7-3882EDF23186}" type="slidenum">
               <a:rPr lang="en-GB" smtClean="0"/>
-              <a:t>‹Nr.›</a:t>
+              <a:t>‹#›</a:t>
             </a:fld>
             <a:endParaRPr lang="en-GB" dirty="0"/>
           </a:p>
@@ -5485,19 +5485,19 @@
   <p:clrMapOvr>
     <a:masterClrMapping/>
   </p:clrMapOvr>
-  <p:transition>
+  <p:transition xmlns:p14="http://schemas.microsoft.com/office/powerpoint/2010/main">
     <p:fade/>
   </p:transition>
   <p:timing>
     <p:tnLst>
       <p:par>
-        <p:cTn id="1" dur="indefinite" restart="never" nodeType="tmRoot"/>
+        <p:cTn xmlns:p14="http://schemas.microsoft.com/office/powerpoint/2010/main" id="1" dur="indefinite" restart="never" nodeType="tmRoot"/>
       </p:par>
     </p:tnLst>
   </p:timing>
   <p:extLst mod="1">
     <p:ext uri="{DCECCB84-F9BA-43D5-87BE-67443E8EF086}">
-      <p15:sldGuideLst xmlns:p15="http://schemas.microsoft.com/office/powerpoint/2012/main"/>
+      <p15:sldGuideLst xmlns:p15="http://schemas.microsoft.com/office/powerpoint/2012/main" xmlns=""/>
     </p:ext>
   </p:extLst>
 </p:sldLayout>
@@ -6531,13 +6531,13 @@
   <p:clrMapOvr>
     <a:masterClrMapping/>
   </p:clrMapOvr>
-  <p:transition>
+  <p:transition xmlns:p14="http://schemas.microsoft.com/office/powerpoint/2010/main">
     <p:fade/>
   </p:transition>
   <p:timing>
     <p:tnLst>
       <p:par>
-        <p:cTn id="1" dur="indefinite" restart="never" nodeType="tmRoot"/>
+        <p:cTn xmlns:p14="http://schemas.microsoft.com/office/powerpoint/2010/main" id="1" dur="indefinite" restart="never" nodeType="tmRoot"/>
       </p:par>
     </p:tnLst>
   </p:timing>
@@ -6683,7 +6683,7 @@
           <a:p>
             <a:fld id="{54A286CA-C5E8-EB43-ABCB-63DC964804C8}" type="datetime1">
               <a:rPr lang="gsw-FR" smtClean="0"/>
-              <a:t>09/09/2016</a:t>
+              <a:t>09.09.16</a:t>
             </a:fld>
             <a:endParaRPr lang="en-GB" dirty="0"/>
           </a:p>
@@ -6729,7 +6729,7 @@
           <a:p>
             <a:fld id="{6C6AE60A-B69C-4790-82F7-3882EDF23186}" type="slidenum">
               <a:rPr lang="en-GB" smtClean="0"/>
-              <a:t>‹Nr.›</a:t>
+              <a:t>‹#›</a:t>
             </a:fld>
             <a:endParaRPr lang="en-GB" dirty="0"/>
           </a:p>
@@ -6780,13 +6780,13 @@
   <p:clrMapOvr>
     <a:masterClrMapping/>
   </p:clrMapOvr>
-  <p:transition>
+  <p:transition xmlns:p14="http://schemas.microsoft.com/office/powerpoint/2010/main">
     <p:fade/>
   </p:transition>
   <p:timing>
     <p:tnLst>
       <p:par>
-        <p:cTn id="1" dur="indefinite" restart="never" nodeType="tmRoot"/>
+        <p:cTn xmlns:p14="http://schemas.microsoft.com/office/powerpoint/2010/main" id="1" dur="indefinite" restart="never" nodeType="tmRoot"/>
       </p:par>
     </p:tnLst>
   </p:timing>
@@ -7101,7 +7101,7 @@
           <a:p>
             <a:fld id="{7298B4F6-298E-9440-A599-796752A2BF20}" type="datetime1">
               <a:rPr lang="gsw-FR" smtClean="0"/>
-              <a:t>09/09/2016</a:t>
+              <a:t>09.09.16</a:t>
             </a:fld>
             <a:endParaRPr lang="en-GB" dirty="0"/>
           </a:p>
@@ -7147,7 +7147,7 @@
           <a:p>
             <a:fld id="{6C6AE60A-B69C-4790-82F7-3882EDF23186}" type="slidenum">
               <a:rPr lang="en-GB" smtClean="0"/>
-              <a:t>‹Nr.›</a:t>
+              <a:t>‹#›</a:t>
             </a:fld>
             <a:endParaRPr lang="en-GB" dirty="0"/>
           </a:p>
@@ -7198,13 +7198,13 @@
   <p:clrMapOvr>
     <a:masterClrMapping/>
   </p:clrMapOvr>
-  <p:transition>
+  <p:transition xmlns:p14="http://schemas.microsoft.com/office/powerpoint/2010/main">
     <p:fade/>
   </p:transition>
   <p:timing>
     <p:tnLst>
       <p:par>
-        <p:cTn id="1" dur="indefinite" restart="never" nodeType="tmRoot"/>
+        <p:cTn xmlns:p14="http://schemas.microsoft.com/office/powerpoint/2010/main" id="1" dur="indefinite" restart="never" nodeType="tmRoot"/>
       </p:par>
     </p:tnLst>
   </p:timing>
@@ -7245,7 +7245,7 @@
           <a:p>
             <a:fld id="{6CA2C0F2-D856-A546-B7C7-4CB8D12279E2}" type="datetime1">
               <a:rPr lang="gsw-FR" smtClean="0"/>
-              <a:t>09/09/2016</a:t>
+              <a:t>09.09.16</a:t>
             </a:fld>
             <a:endParaRPr lang="en-GB" dirty="0"/>
           </a:p>
@@ -7291,7 +7291,7 @@
           <a:p>
             <a:fld id="{6C6AE60A-B69C-4790-82F7-3882EDF23186}" type="slidenum">
               <a:rPr lang="en-GB" smtClean="0"/>
-              <a:t>‹Nr.›</a:t>
+              <a:t>‹#›</a:t>
             </a:fld>
             <a:endParaRPr lang="en-GB" dirty="0"/>
           </a:p>
@@ -7339,13 +7339,13 @@
   <p:clrMapOvr>
     <a:masterClrMapping/>
   </p:clrMapOvr>
-  <p:transition>
+  <p:transition xmlns:p14="http://schemas.microsoft.com/office/powerpoint/2010/main">
     <p:fade/>
   </p:transition>
   <p:timing>
     <p:tnLst>
       <p:par>
-        <p:cTn id="1" dur="indefinite" restart="never" nodeType="tmRoot"/>
+        <p:cTn xmlns:p14="http://schemas.microsoft.com/office/powerpoint/2010/main" id="1" dur="indefinite" restart="never" nodeType="tmRoot"/>
       </p:par>
     </p:tnLst>
   </p:timing>
@@ -7386,7 +7386,7 @@
           <a:p>
             <a:fld id="{D9894994-4B99-1E4F-A7EA-9F4366B7B104}" type="datetime1">
               <a:rPr lang="gsw-FR" smtClean="0"/>
-              <a:t>09/09/2016</a:t>
+              <a:t>09.09.16</a:t>
             </a:fld>
             <a:endParaRPr lang="en-GB" dirty="0"/>
           </a:p>
@@ -7432,7 +7432,7 @@
           <a:p>
             <a:fld id="{6C6AE60A-B69C-4790-82F7-3882EDF23186}" type="slidenum">
               <a:rPr lang="en-GB" smtClean="0"/>
-              <a:t>‹Nr.›</a:t>
+              <a:t>‹#›</a:t>
             </a:fld>
             <a:endParaRPr lang="en-GB" dirty="0"/>
           </a:p>
@@ -7481,13 +7481,13 @@
   <p:clrMapOvr>
     <a:masterClrMapping/>
   </p:clrMapOvr>
-  <p:transition>
+  <p:transition xmlns:p14="http://schemas.microsoft.com/office/powerpoint/2010/main">
     <p:fade/>
   </p:transition>
   <p:timing>
     <p:tnLst>
       <p:par>
-        <p:cTn id="1" dur="indefinite" restart="never" nodeType="tmRoot"/>
+        <p:cTn xmlns:p14="http://schemas.microsoft.com/office/powerpoint/2010/main" id="1" dur="indefinite" restart="never" nodeType="tmRoot"/>
       </p:par>
     </p:tnLst>
   </p:timing>
@@ -7574,7 +7574,7 @@
           <a:p>
             <a:fld id="{0671D01A-5713-5142-AAFD-68F18A4024CF}" type="datetime1">
               <a:rPr lang="gsw-FR" smtClean="0"/>
-              <a:t>09/09/2016</a:t>
+              <a:t>09.09.16</a:t>
             </a:fld>
             <a:endParaRPr lang="en-GB" dirty="0"/>
           </a:p>
@@ -7620,7 +7620,7 @@
           <a:p>
             <a:fld id="{6C6AE60A-B69C-4790-82F7-3882EDF23186}" type="slidenum">
               <a:rPr lang="en-GB" smtClean="0"/>
-              <a:t>‹Nr.›</a:t>
+              <a:t>‹#›</a:t>
             </a:fld>
             <a:endParaRPr lang="en-GB" dirty="0"/>
           </a:p>
@@ -7666,13 +7666,13 @@
   <p:clrMapOvr>
     <a:masterClrMapping/>
   </p:clrMapOvr>
-  <p:transition>
+  <p:transition xmlns:p14="http://schemas.microsoft.com/office/powerpoint/2010/main">
     <p:fade/>
   </p:transition>
   <p:timing>
     <p:tnLst>
       <p:par>
-        <p:cTn id="1" dur="indefinite" restart="never" nodeType="tmRoot"/>
+        <p:cTn xmlns:p14="http://schemas.microsoft.com/office/powerpoint/2010/main" id="1" dur="indefinite" restart="never" nodeType="tmRoot"/>
       </p:par>
     </p:tnLst>
   </p:timing>
@@ -7836,7 +7836,7 @@
           <a:p>
             <a:fld id="{4BFA3CDE-5D25-3B45-B293-503E2E4CA74D}" type="datetime1">
               <a:rPr lang="gsw-FR" smtClean="0"/>
-              <a:t>09/09/2016</a:t>
+              <a:t>09.09.16</a:t>
             </a:fld>
             <a:endParaRPr lang="en-GB" dirty="0"/>
           </a:p>
@@ -7859,7 +7859,7 @@
           <a:p>
             <a:fld id="{6C6AE60A-B69C-4790-82F7-3882EDF23186}" type="slidenum">
               <a:rPr lang="en-GB" smtClean="0"/>
-              <a:t>‹Nr.›</a:t>
+              <a:t>‹#›</a:t>
             </a:fld>
             <a:endParaRPr lang="en-GB" dirty="0"/>
           </a:p>
@@ -7967,13 +7967,13 @@
   <p:clrMapOvr>
     <a:masterClrMapping/>
   </p:clrMapOvr>
-  <p:transition>
+  <p:transition xmlns:p14="http://schemas.microsoft.com/office/powerpoint/2010/main">
     <p:fade/>
   </p:transition>
   <p:timing>
     <p:tnLst>
       <p:par>
-        <p:cTn id="1" dur="indefinite" restart="never" nodeType="tmRoot"/>
+        <p:cTn xmlns:p14="http://schemas.microsoft.com/office/powerpoint/2010/main" id="1" dur="indefinite" restart="never" nodeType="tmRoot"/>
       </p:par>
     </p:tnLst>
   </p:timing>
@@ -8184,7 +8184,7 @@
           <a:p>
             <a:fld id="{2E668FA9-0AC9-924A-A0CC-1930123E0B89}" type="datetime1">
               <a:rPr lang="gsw-FR" smtClean="0"/>
-              <a:t>09/09/2016</a:t>
+              <a:t>09.09.16</a:t>
             </a:fld>
             <a:endParaRPr lang="en-GB" dirty="0"/>
           </a:p>
@@ -8230,7 +8230,7 @@
           <a:p>
             <a:fld id="{6C6AE60A-B69C-4790-82F7-3882EDF23186}" type="slidenum">
               <a:rPr lang="en-GB" smtClean="0"/>
-              <a:t>‹Nr.›</a:t>
+              <a:t>‹#›</a:t>
             </a:fld>
             <a:endParaRPr lang="en-GB" dirty="0"/>
           </a:p>
@@ -8279,13 +8279,13 @@
   <p:clrMapOvr>
     <a:masterClrMapping/>
   </p:clrMapOvr>
-  <p:transition>
+  <p:transition xmlns:p14="http://schemas.microsoft.com/office/powerpoint/2010/main">
     <p:fade/>
   </p:transition>
   <p:timing>
     <p:tnLst>
       <p:par>
-        <p:cTn id="1" dur="indefinite" restart="never" nodeType="tmRoot"/>
+        <p:cTn xmlns:p14="http://schemas.microsoft.com/office/powerpoint/2010/main" id="1" dur="indefinite" restart="never" nodeType="tmRoot"/>
       </p:par>
     </p:tnLst>
   </p:timing>
@@ -8492,7 +8492,7 @@
           <a:p>
             <a:fld id="{28D1C4F7-0136-9E4A-B426-9AFF6ACFFCFA}" type="datetime1">
               <a:rPr lang="gsw-FR" smtClean="0"/>
-              <a:t>09/09/2016</a:t>
+              <a:t>09.09.16</a:t>
             </a:fld>
             <a:endParaRPr lang="en-GB" dirty="0"/>
           </a:p>
@@ -8538,7 +8538,7 @@
           <a:p>
             <a:fld id="{6C6AE60A-B69C-4790-82F7-3882EDF23186}" type="slidenum">
               <a:rPr lang="en-GB" smtClean="0"/>
-              <a:t>‹Nr.›</a:t>
+              <a:t>‹#›</a:t>
             </a:fld>
             <a:endParaRPr lang="en-GB" dirty="0"/>
           </a:p>
@@ -8587,19 +8587,19 @@
   <p:clrMapOvr>
     <a:masterClrMapping/>
   </p:clrMapOvr>
-  <p:transition>
+  <p:transition xmlns:p14="http://schemas.microsoft.com/office/powerpoint/2010/main">
     <p:fade/>
   </p:transition>
   <p:timing>
     <p:tnLst>
       <p:par>
-        <p:cTn id="1" dur="indefinite" restart="never" nodeType="tmRoot"/>
+        <p:cTn xmlns:p14="http://schemas.microsoft.com/office/powerpoint/2010/main" id="1" dur="indefinite" restart="never" nodeType="tmRoot"/>
       </p:par>
     </p:tnLst>
   </p:timing>
   <p:extLst mod="1">
     <p:ext uri="{DCECCB84-F9BA-43D5-87BE-67443E8EF086}">
-      <p15:sldGuideLst xmlns:p15="http://schemas.microsoft.com/office/powerpoint/2012/main"/>
+      <p15:sldGuideLst xmlns:p15="http://schemas.microsoft.com/office/powerpoint/2012/main" xmlns=""/>
     </p:ext>
   </p:extLst>
 </p:sldLayout>
@@ -8805,7 +8805,7 @@
           <a:p>
             <a:fld id="{55BE5348-78DF-D14B-854A-6D31AAAF833A}" type="datetime1">
               <a:rPr lang="gsw-FR" smtClean="0"/>
-              <a:t>09/09/2016</a:t>
+              <a:t>09.09.16</a:t>
             </a:fld>
             <a:endParaRPr lang="en-GB" dirty="0"/>
           </a:p>
@@ -8851,7 +8851,7 @@
           <a:p>
             <a:fld id="{6C6AE60A-B69C-4790-82F7-3882EDF23186}" type="slidenum">
               <a:rPr lang="en-GB" smtClean="0"/>
-              <a:t>‹Nr.›</a:t>
+              <a:t>‹#›</a:t>
             </a:fld>
             <a:endParaRPr lang="en-GB" dirty="0"/>
           </a:p>
@@ -8900,19 +8900,19 @@
   <p:clrMapOvr>
     <a:masterClrMapping/>
   </p:clrMapOvr>
-  <p:transition>
+  <p:transition xmlns:p14="http://schemas.microsoft.com/office/powerpoint/2010/main">
     <p:fade/>
   </p:transition>
   <p:timing>
     <p:tnLst>
       <p:par>
-        <p:cTn id="1" dur="indefinite" restart="never" nodeType="tmRoot"/>
+        <p:cTn xmlns:p14="http://schemas.microsoft.com/office/powerpoint/2010/main" id="1" dur="indefinite" restart="never" nodeType="tmRoot"/>
       </p:par>
     </p:tnLst>
   </p:timing>
   <p:extLst mod="1">
     <p:ext uri="{DCECCB84-F9BA-43D5-87BE-67443E8EF086}">
-      <p15:sldGuideLst xmlns:p15="http://schemas.microsoft.com/office/powerpoint/2012/main"/>
+      <p15:sldGuideLst xmlns:p15="http://schemas.microsoft.com/office/powerpoint/2012/main" xmlns=""/>
     </p:ext>
   </p:extLst>
 </p:sldLayout>
@@ -9946,13 +9946,13 @@
   <p:clrMapOvr>
     <a:masterClrMapping/>
   </p:clrMapOvr>
-  <p:transition>
+  <p:transition xmlns:p14="http://schemas.microsoft.com/office/powerpoint/2010/main">
     <p:fade/>
   </p:transition>
   <p:timing>
     <p:tnLst>
       <p:par>
-        <p:cTn id="1" dur="indefinite" restart="never" nodeType="tmRoot"/>
+        <p:cTn xmlns:p14="http://schemas.microsoft.com/office/powerpoint/2010/main" id="1" dur="indefinite" restart="never" nodeType="tmRoot"/>
       </p:par>
     </p:tnLst>
   </p:timing>
@@ -10098,7 +10098,7 @@
           <a:p>
             <a:fld id="{19AB8706-2CE0-8C49-B36E-BD46ABC76C96}" type="datetime1">
               <a:rPr lang="gsw-FR" smtClean="0"/>
-              <a:t>09/09/2016</a:t>
+              <a:t>09.09.16</a:t>
             </a:fld>
             <a:endParaRPr lang="en-GB" dirty="0"/>
           </a:p>
@@ -10144,7 +10144,7 @@
           <a:p>
             <a:fld id="{6C6AE60A-B69C-4790-82F7-3882EDF23186}" type="slidenum">
               <a:rPr lang="en-GB" smtClean="0"/>
-              <a:t>‹Nr.›</a:t>
+              <a:t>‹#›</a:t>
             </a:fld>
             <a:endParaRPr lang="en-GB" dirty="0"/>
           </a:p>
@@ -10195,13 +10195,13 @@
   <p:clrMapOvr>
     <a:masterClrMapping/>
   </p:clrMapOvr>
-  <p:transition>
+  <p:transition xmlns:p14="http://schemas.microsoft.com/office/powerpoint/2010/main">
     <p:fade/>
   </p:transition>
   <p:timing>
     <p:tnLst>
       <p:par>
-        <p:cTn id="1" dur="indefinite" restart="never" nodeType="tmRoot"/>
+        <p:cTn xmlns:p14="http://schemas.microsoft.com/office/powerpoint/2010/main" id="1" dur="indefinite" restart="never" nodeType="tmRoot"/>
       </p:par>
     </p:tnLst>
   </p:timing>
@@ -10516,7 +10516,7 @@
           <a:p>
             <a:fld id="{8B285921-1F4D-2047-BDB4-825D1E9A7A51}" type="datetime1">
               <a:rPr lang="gsw-FR" smtClean="0"/>
-              <a:t>09/09/2016</a:t>
+              <a:t>09.09.16</a:t>
             </a:fld>
             <a:endParaRPr lang="en-GB" dirty="0"/>
           </a:p>
@@ -10562,7 +10562,7 @@
           <a:p>
             <a:fld id="{6C6AE60A-B69C-4790-82F7-3882EDF23186}" type="slidenum">
               <a:rPr lang="en-GB" smtClean="0"/>
-              <a:t>‹Nr.›</a:t>
+              <a:t>‹#›</a:t>
             </a:fld>
             <a:endParaRPr lang="en-GB" dirty="0"/>
           </a:p>
@@ -10613,13 +10613,13 @@
   <p:clrMapOvr>
     <a:masterClrMapping/>
   </p:clrMapOvr>
-  <p:transition>
+  <p:transition xmlns:p14="http://schemas.microsoft.com/office/powerpoint/2010/main">
     <p:fade/>
   </p:transition>
   <p:timing>
     <p:tnLst>
       <p:par>
-        <p:cTn id="1" dur="indefinite" restart="never" nodeType="tmRoot"/>
+        <p:cTn xmlns:p14="http://schemas.microsoft.com/office/powerpoint/2010/main" id="1" dur="indefinite" restart="never" nodeType="tmRoot"/>
       </p:par>
     </p:tnLst>
   </p:timing>
@@ -10660,7 +10660,7 @@
           <a:p>
             <a:fld id="{7C1AFBB9-18D8-D344-ADA1-52FC4FC265D8}" type="datetime1">
               <a:rPr lang="gsw-FR" smtClean="0"/>
-              <a:t>09/09/2016</a:t>
+              <a:t>09.09.16</a:t>
             </a:fld>
             <a:endParaRPr lang="en-GB" dirty="0"/>
           </a:p>
@@ -10706,7 +10706,7 @@
           <a:p>
             <a:fld id="{6C6AE60A-B69C-4790-82F7-3882EDF23186}" type="slidenum">
               <a:rPr lang="en-GB" smtClean="0"/>
-              <a:t>‹Nr.›</a:t>
+              <a:t>‹#›</a:t>
             </a:fld>
             <a:endParaRPr lang="en-GB" dirty="0"/>
           </a:p>
@@ -10754,13 +10754,13 @@
   <p:clrMapOvr>
     <a:masterClrMapping/>
   </p:clrMapOvr>
-  <p:transition>
+  <p:transition xmlns:p14="http://schemas.microsoft.com/office/powerpoint/2010/main">
     <p:fade/>
   </p:transition>
   <p:timing>
     <p:tnLst>
       <p:par>
-        <p:cTn id="1" dur="indefinite" restart="never" nodeType="tmRoot"/>
+        <p:cTn xmlns:p14="http://schemas.microsoft.com/office/powerpoint/2010/main" id="1" dur="indefinite" restart="never" nodeType="tmRoot"/>
       </p:par>
     </p:tnLst>
   </p:timing>
@@ -10801,7 +10801,7 @@
           <a:p>
             <a:fld id="{2176A1D1-D5FA-7A42-86C8-D49105883037}" type="datetime1">
               <a:rPr lang="gsw-FR" smtClean="0"/>
-              <a:t>09/09/2016</a:t>
+              <a:t>09.09.16</a:t>
             </a:fld>
             <a:endParaRPr lang="en-GB" dirty="0"/>
           </a:p>
@@ -10847,7 +10847,7 @@
           <a:p>
             <a:fld id="{6C6AE60A-B69C-4790-82F7-3882EDF23186}" type="slidenum">
               <a:rPr lang="en-GB" smtClean="0"/>
-              <a:t>‹Nr.›</a:t>
+              <a:t>‹#›</a:t>
             </a:fld>
             <a:endParaRPr lang="en-GB" dirty="0"/>
           </a:p>
@@ -10896,13 +10896,13 @@
   <p:clrMapOvr>
     <a:masterClrMapping/>
   </p:clrMapOvr>
-  <p:transition>
+  <p:transition xmlns:p14="http://schemas.microsoft.com/office/powerpoint/2010/main">
     <p:fade/>
   </p:transition>
   <p:timing>
     <p:tnLst>
       <p:par>
-        <p:cTn id="1" dur="indefinite" restart="never" nodeType="tmRoot"/>
+        <p:cTn xmlns:p14="http://schemas.microsoft.com/office/powerpoint/2010/main" id="1" dur="indefinite" restart="never" nodeType="tmRoot"/>
       </p:par>
     </p:tnLst>
   </p:timing>
@@ -10989,7 +10989,7 @@
           <a:p>
             <a:fld id="{7EFA8AF1-1000-624C-BDC1-F31585B6A711}" type="datetime1">
               <a:rPr lang="gsw-FR" smtClean="0"/>
-              <a:t>09/09/2016</a:t>
+              <a:t>09.09.16</a:t>
             </a:fld>
             <a:endParaRPr lang="en-GB" dirty="0"/>
           </a:p>
@@ -11035,7 +11035,7 @@
           <a:p>
             <a:fld id="{6C6AE60A-B69C-4790-82F7-3882EDF23186}" type="slidenum">
               <a:rPr lang="en-GB" smtClean="0"/>
-              <a:t>‹Nr.›</a:t>
+              <a:t>‹#›</a:t>
             </a:fld>
             <a:endParaRPr lang="en-GB" dirty="0"/>
           </a:p>
@@ -11081,13 +11081,13 @@
   <p:clrMapOvr>
     <a:masterClrMapping/>
   </p:clrMapOvr>
-  <p:transition>
+  <p:transition xmlns:p14="http://schemas.microsoft.com/office/powerpoint/2010/main">
     <p:fade/>
   </p:transition>
   <p:timing>
     <p:tnLst>
       <p:par>
-        <p:cTn id="1" dur="indefinite" restart="never" nodeType="tmRoot"/>
+        <p:cTn xmlns:p14="http://schemas.microsoft.com/office/powerpoint/2010/main" id="1" dur="indefinite" restart="never" nodeType="tmRoot"/>
       </p:par>
     </p:tnLst>
   </p:timing>
@@ -11251,7 +11251,7 @@
           <a:p>
             <a:fld id="{12F85614-3C5E-E14B-ACD5-34D5FB03C320}" type="datetime1">
               <a:rPr lang="gsw-FR" smtClean="0"/>
-              <a:t>09/09/2016</a:t>
+              <a:t>09.09.16</a:t>
             </a:fld>
             <a:endParaRPr lang="en-GB" dirty="0"/>
           </a:p>
@@ -11274,7 +11274,7 @@
           <a:p>
             <a:fld id="{6C6AE60A-B69C-4790-82F7-3882EDF23186}" type="slidenum">
               <a:rPr lang="en-GB" smtClean="0"/>
-              <a:t>‹Nr.›</a:t>
+              <a:t>‹#›</a:t>
             </a:fld>
             <a:endParaRPr lang="en-GB" dirty="0"/>
           </a:p>
@@ -11382,13 +11382,13 @@
   <p:clrMapOvr>
     <a:masterClrMapping/>
   </p:clrMapOvr>
-  <p:transition>
+  <p:transition xmlns:p14="http://schemas.microsoft.com/office/powerpoint/2010/main">
     <p:fade/>
   </p:transition>
   <p:timing>
     <p:tnLst>
       <p:par>
-        <p:cTn id="1" dur="indefinite" restart="never" nodeType="tmRoot"/>
+        <p:cTn xmlns:p14="http://schemas.microsoft.com/office/powerpoint/2010/main" id="1" dur="indefinite" restart="never" nodeType="tmRoot"/>
       </p:par>
     </p:tnLst>
   </p:timing>
@@ -11599,7 +11599,7 @@
           <a:p>
             <a:fld id="{294DBC7A-B022-7148-B8A2-362F4B1C0906}" type="datetime1">
               <a:rPr lang="gsw-FR" smtClean="0"/>
-              <a:t>09/09/2016</a:t>
+              <a:t>09.09.16</a:t>
             </a:fld>
             <a:endParaRPr lang="en-GB" dirty="0"/>
           </a:p>
@@ -11645,7 +11645,7 @@
           <a:p>
             <a:fld id="{6C6AE60A-B69C-4790-82F7-3882EDF23186}" type="slidenum">
               <a:rPr lang="en-GB" smtClean="0"/>
-              <a:t>‹Nr.›</a:t>
+              <a:t>‹#›</a:t>
             </a:fld>
             <a:endParaRPr lang="en-GB" dirty="0"/>
           </a:p>
@@ -11694,13 +11694,13 @@
   <p:clrMapOvr>
     <a:masterClrMapping/>
   </p:clrMapOvr>
-  <p:transition>
+  <p:transition xmlns:p14="http://schemas.microsoft.com/office/powerpoint/2010/main">
     <p:fade/>
   </p:transition>
   <p:timing>
     <p:tnLst>
       <p:par>
-        <p:cTn id="1" dur="indefinite" restart="never" nodeType="tmRoot"/>
+        <p:cTn xmlns:p14="http://schemas.microsoft.com/office/powerpoint/2010/main" id="1" dur="indefinite" restart="never" nodeType="tmRoot"/>
       </p:par>
     </p:tnLst>
   </p:timing>
@@ -11907,7 +11907,7 @@
           <a:p>
             <a:fld id="{8EABD056-7D96-714B-87A9-87E70C679697}" type="datetime1">
               <a:rPr lang="gsw-FR" smtClean="0"/>
-              <a:t>09/09/2016</a:t>
+              <a:t>09.09.16</a:t>
             </a:fld>
             <a:endParaRPr lang="en-GB" dirty="0"/>
           </a:p>
@@ -11953,7 +11953,7 @@
           <a:p>
             <a:fld id="{6C6AE60A-B69C-4790-82F7-3882EDF23186}" type="slidenum">
               <a:rPr lang="en-GB" smtClean="0"/>
-              <a:t>‹Nr.›</a:t>
+              <a:t>‹#›</a:t>
             </a:fld>
             <a:endParaRPr lang="en-GB" dirty="0"/>
           </a:p>
@@ -12002,19 +12002,19 @@
   <p:clrMapOvr>
     <a:masterClrMapping/>
   </p:clrMapOvr>
-  <p:transition>
+  <p:transition xmlns:p14="http://schemas.microsoft.com/office/powerpoint/2010/main">
     <p:fade/>
   </p:transition>
   <p:timing>
     <p:tnLst>
       <p:par>
-        <p:cTn id="1" dur="indefinite" restart="never" nodeType="tmRoot"/>
+        <p:cTn xmlns:p14="http://schemas.microsoft.com/office/powerpoint/2010/main" id="1" dur="indefinite" restart="never" nodeType="tmRoot"/>
       </p:par>
     </p:tnLst>
   </p:timing>
   <p:extLst mod="1">
     <p:ext uri="{DCECCB84-F9BA-43D5-87BE-67443E8EF086}">
-      <p15:sldGuideLst xmlns:p15="http://schemas.microsoft.com/office/powerpoint/2012/main"/>
+      <p15:sldGuideLst xmlns:p15="http://schemas.microsoft.com/office/powerpoint/2012/main" xmlns=""/>
     </p:ext>
   </p:extLst>
 </p:sldLayout>
@@ -13048,13 +13048,13 @@
   <p:clrMapOvr>
     <a:masterClrMapping/>
   </p:clrMapOvr>
-  <p:transition>
+  <p:transition xmlns:p14="http://schemas.microsoft.com/office/powerpoint/2010/main">
     <p:fade/>
   </p:transition>
   <p:timing>
     <p:tnLst>
       <p:par>
-        <p:cTn id="1" dur="indefinite" restart="never" nodeType="tmRoot"/>
+        <p:cTn xmlns:p14="http://schemas.microsoft.com/office/powerpoint/2010/main" id="1" dur="indefinite" restart="never" nodeType="tmRoot"/>
       </p:par>
     </p:tnLst>
   </p:timing>
@@ -14089,13 +14089,13 @@
   <p:clrMapOvr>
     <a:masterClrMapping/>
   </p:clrMapOvr>
-  <p:transition>
+  <p:transition xmlns:p14="http://schemas.microsoft.com/office/powerpoint/2010/main">
     <p:fade/>
   </p:transition>
   <p:timing>
     <p:tnLst>
       <p:par>
-        <p:cTn id="1" dur="indefinite" restart="never" nodeType="tmRoot"/>
+        <p:cTn xmlns:p14="http://schemas.microsoft.com/office/powerpoint/2010/main" id="1" dur="indefinite" restart="never" nodeType="tmRoot"/>
       </p:par>
     </p:tnLst>
   </p:timing>
@@ -14241,7 +14241,7 @@
           <a:p>
             <a:fld id="{C29A8C76-BF6C-494F-BDEF-FD7BAD69B6CC}" type="datetime1">
               <a:rPr lang="gsw-FR" smtClean="0"/>
-              <a:t>09/09/2016</a:t>
+              <a:t>09.09.16</a:t>
             </a:fld>
             <a:endParaRPr lang="en-GB" dirty="0"/>
           </a:p>
@@ -14287,7 +14287,7 @@
           <a:p>
             <a:fld id="{6C6AE60A-B69C-4790-82F7-3882EDF23186}" type="slidenum">
               <a:rPr lang="en-GB" smtClean="0"/>
-              <a:t>‹Nr.›</a:t>
+              <a:t>‹#›</a:t>
             </a:fld>
             <a:endParaRPr lang="en-GB" dirty="0"/>
           </a:p>
@@ -14338,13 +14338,13 @@
   <p:clrMapOvr>
     <a:masterClrMapping/>
   </p:clrMapOvr>
-  <p:transition>
+  <p:transition xmlns:p14="http://schemas.microsoft.com/office/powerpoint/2010/main">
     <p:fade/>
   </p:transition>
   <p:timing>
     <p:tnLst>
       <p:par>
-        <p:cTn id="1" dur="indefinite" restart="never" nodeType="tmRoot"/>
+        <p:cTn xmlns:p14="http://schemas.microsoft.com/office/powerpoint/2010/main" id="1" dur="indefinite" restart="never" nodeType="tmRoot"/>
       </p:par>
     </p:tnLst>
   </p:timing>
@@ -14659,7 +14659,7 @@
           <a:p>
             <a:fld id="{35E67F1E-A0A6-4D41-BFC0-725D9D7F1EEE}" type="datetime1">
               <a:rPr lang="gsw-FR" smtClean="0"/>
-              <a:t>09/09/2016</a:t>
+              <a:t>09.09.16</a:t>
             </a:fld>
             <a:endParaRPr lang="en-GB" dirty="0"/>
           </a:p>
@@ -14705,7 +14705,7 @@
           <a:p>
             <a:fld id="{6C6AE60A-B69C-4790-82F7-3882EDF23186}" type="slidenum">
               <a:rPr lang="en-GB" smtClean="0"/>
-              <a:t>‹Nr.›</a:t>
+              <a:t>‹#›</a:t>
             </a:fld>
             <a:endParaRPr lang="en-GB" dirty="0"/>
           </a:p>
@@ -14756,13 +14756,13 @@
   <p:clrMapOvr>
     <a:masterClrMapping/>
   </p:clrMapOvr>
-  <p:transition>
+  <p:transition xmlns:p14="http://schemas.microsoft.com/office/powerpoint/2010/main">
     <p:fade/>
   </p:transition>
   <p:timing>
     <p:tnLst>
       <p:par>
-        <p:cTn id="1" dur="indefinite" restart="never" nodeType="tmRoot"/>
+        <p:cTn xmlns:p14="http://schemas.microsoft.com/office/powerpoint/2010/main" id="1" dur="indefinite" restart="never" nodeType="tmRoot"/>
       </p:par>
     </p:tnLst>
   </p:timing>
@@ -14803,7 +14803,7 @@
           <a:p>
             <a:fld id="{36AF184B-8B00-AA48-8EA4-A24ED1D6F0CF}" type="datetime1">
               <a:rPr lang="gsw-FR" smtClean="0"/>
-              <a:t>09/09/2016</a:t>
+              <a:t>09.09.16</a:t>
             </a:fld>
             <a:endParaRPr lang="en-GB" dirty="0"/>
           </a:p>
@@ -14849,7 +14849,7 @@
           <a:p>
             <a:fld id="{6C6AE60A-B69C-4790-82F7-3882EDF23186}" type="slidenum">
               <a:rPr lang="en-GB" smtClean="0"/>
-              <a:t>‹Nr.›</a:t>
+              <a:t>‹#›</a:t>
             </a:fld>
             <a:endParaRPr lang="en-GB" dirty="0"/>
           </a:p>
@@ -14897,13 +14897,13 @@
   <p:clrMapOvr>
     <a:masterClrMapping/>
   </p:clrMapOvr>
-  <p:transition>
+  <p:transition xmlns:p14="http://schemas.microsoft.com/office/powerpoint/2010/main">
     <p:fade/>
   </p:transition>
   <p:timing>
     <p:tnLst>
       <p:par>
-        <p:cTn id="1" dur="indefinite" restart="never" nodeType="tmRoot"/>
+        <p:cTn xmlns:p14="http://schemas.microsoft.com/office/powerpoint/2010/main" id="1" dur="indefinite" restart="never" nodeType="tmRoot"/>
       </p:par>
     </p:tnLst>
   </p:timing>
@@ -14944,7 +14944,7 @@
           <a:p>
             <a:fld id="{3D5C2333-6628-D849-A896-640E2ED65FA8}" type="datetime1">
               <a:rPr lang="gsw-FR" smtClean="0"/>
-              <a:t>09/09/2016</a:t>
+              <a:t>09.09.16</a:t>
             </a:fld>
             <a:endParaRPr lang="en-GB" dirty="0"/>
           </a:p>
@@ -14990,7 +14990,7 @@
           <a:p>
             <a:fld id="{6C6AE60A-B69C-4790-82F7-3882EDF23186}" type="slidenum">
               <a:rPr lang="en-GB" smtClean="0"/>
-              <a:t>‹Nr.›</a:t>
+              <a:t>‹#›</a:t>
             </a:fld>
             <a:endParaRPr lang="en-GB" dirty="0"/>
           </a:p>
@@ -15039,13 +15039,13 @@
   <p:clrMapOvr>
     <a:masterClrMapping/>
   </p:clrMapOvr>
-  <p:transition>
+  <p:transition xmlns:p14="http://schemas.microsoft.com/office/powerpoint/2010/main">
     <p:fade/>
   </p:transition>
   <p:timing>
     <p:tnLst>
       <p:par>
-        <p:cTn id="1" dur="indefinite" restart="never" nodeType="tmRoot"/>
+        <p:cTn xmlns:p14="http://schemas.microsoft.com/office/powerpoint/2010/main" id="1" dur="indefinite" restart="never" nodeType="tmRoot"/>
       </p:par>
     </p:tnLst>
   </p:timing>
@@ -15132,7 +15132,7 @@
           <a:p>
             <a:fld id="{32241220-D8C7-1E43-B2F9-C68063B5C474}" type="datetime1">
               <a:rPr lang="gsw-FR" smtClean="0"/>
-              <a:t>09/09/2016</a:t>
+              <a:t>09.09.16</a:t>
             </a:fld>
             <a:endParaRPr lang="en-GB" dirty="0"/>
           </a:p>
@@ -15178,7 +15178,7 @@
           <a:p>
             <a:fld id="{6C6AE60A-B69C-4790-82F7-3882EDF23186}" type="slidenum">
               <a:rPr lang="en-GB" smtClean="0"/>
-              <a:t>‹Nr.›</a:t>
+              <a:t>‹#›</a:t>
             </a:fld>
             <a:endParaRPr lang="en-GB" dirty="0"/>
           </a:p>
@@ -15224,13 +15224,13 @@
   <p:clrMapOvr>
     <a:masterClrMapping/>
   </p:clrMapOvr>
-  <p:transition>
+  <p:transition xmlns:p14="http://schemas.microsoft.com/office/powerpoint/2010/main">
     <p:fade/>
   </p:transition>
   <p:timing>
     <p:tnLst>
       <p:par>
-        <p:cTn id="1" dur="indefinite" restart="never" nodeType="tmRoot"/>
+        <p:cTn xmlns:p14="http://schemas.microsoft.com/office/powerpoint/2010/main" id="1" dur="indefinite" restart="never" nodeType="tmRoot"/>
       </p:par>
     </p:tnLst>
   </p:timing>
@@ -15394,7 +15394,7 @@
           <a:p>
             <a:fld id="{DFB18634-60E5-A342-A850-4AE2C9EAC2BC}" type="datetime1">
               <a:rPr lang="gsw-FR" smtClean="0"/>
-              <a:t>09/09/2016</a:t>
+              <a:t>09.09.16</a:t>
             </a:fld>
             <a:endParaRPr lang="en-GB" dirty="0"/>
           </a:p>
@@ -15417,7 +15417,7 @@
           <a:p>
             <a:fld id="{6C6AE60A-B69C-4790-82F7-3882EDF23186}" type="slidenum">
               <a:rPr lang="en-GB" smtClean="0"/>
-              <a:t>‹Nr.›</a:t>
+              <a:t>‹#›</a:t>
             </a:fld>
             <a:endParaRPr lang="en-GB" dirty="0"/>
           </a:p>
@@ -15525,13 +15525,13 @@
   <p:clrMapOvr>
     <a:masterClrMapping/>
   </p:clrMapOvr>
-  <p:transition>
+  <p:transition xmlns:p14="http://schemas.microsoft.com/office/powerpoint/2010/main">
     <p:fade/>
   </p:transition>
   <p:timing>
     <p:tnLst>
       <p:par>
-        <p:cTn id="1" dur="indefinite" restart="never" nodeType="tmRoot"/>
+        <p:cTn xmlns:p14="http://schemas.microsoft.com/office/powerpoint/2010/main" id="1" dur="indefinite" restart="never" nodeType="tmRoot"/>
       </p:par>
     </p:tnLst>
   </p:timing>
@@ -15742,7 +15742,7 @@
           <a:p>
             <a:fld id="{6C661337-C7E0-DF4E-88B8-EF199F0F30BD}" type="datetime1">
               <a:rPr lang="gsw-FR" smtClean="0"/>
-              <a:t>09/09/2016</a:t>
+              <a:t>09.09.16</a:t>
             </a:fld>
             <a:endParaRPr lang="en-GB" dirty="0"/>
           </a:p>
@@ -15788,7 +15788,7 @@
           <a:p>
             <a:fld id="{6C6AE60A-B69C-4790-82F7-3882EDF23186}" type="slidenum">
               <a:rPr lang="en-GB" smtClean="0"/>
-              <a:t>‹Nr.›</a:t>
+              <a:t>‹#›</a:t>
             </a:fld>
             <a:endParaRPr lang="en-GB" dirty="0"/>
           </a:p>
@@ -15837,13 +15837,13 @@
   <p:clrMapOvr>
     <a:masterClrMapping/>
   </p:clrMapOvr>
-  <p:transition>
+  <p:transition xmlns:p14="http://schemas.microsoft.com/office/powerpoint/2010/main">
     <p:fade/>
   </p:transition>
   <p:timing>
     <p:tnLst>
       <p:par>
-        <p:cTn id="1" dur="indefinite" restart="never" nodeType="tmRoot"/>
+        <p:cTn xmlns:p14="http://schemas.microsoft.com/office/powerpoint/2010/main" id="1" dur="indefinite" restart="never" nodeType="tmRoot"/>
       </p:par>
     </p:tnLst>
   </p:timing>
@@ -16050,7 +16050,7 @@
           <a:p>
             <a:fld id="{3577BEF4-AF21-744A-A9C2-8D109ACB6F00}" type="datetime1">
               <a:rPr lang="gsw-FR" smtClean="0"/>
-              <a:t>09/09/2016</a:t>
+              <a:t>09.09.16</a:t>
             </a:fld>
             <a:endParaRPr lang="en-GB" dirty="0"/>
           </a:p>
@@ -16096,7 +16096,7 @@
           <a:p>
             <a:fld id="{6C6AE60A-B69C-4790-82F7-3882EDF23186}" type="slidenum">
               <a:rPr lang="en-GB" smtClean="0"/>
-              <a:t>‹Nr.›</a:t>
+              <a:t>‹#›</a:t>
             </a:fld>
             <a:endParaRPr lang="en-GB" dirty="0"/>
           </a:p>
@@ -16145,19 +16145,19 @@
   <p:clrMapOvr>
     <a:masterClrMapping/>
   </p:clrMapOvr>
-  <p:transition>
+  <p:transition xmlns:p14="http://schemas.microsoft.com/office/powerpoint/2010/main">
     <p:fade/>
   </p:transition>
   <p:timing>
     <p:tnLst>
       <p:par>
-        <p:cTn id="1" dur="indefinite" restart="never" nodeType="tmRoot"/>
+        <p:cTn xmlns:p14="http://schemas.microsoft.com/office/powerpoint/2010/main" id="1" dur="indefinite" restart="never" nodeType="tmRoot"/>
       </p:par>
     </p:tnLst>
   </p:timing>
   <p:extLst mod="1">
     <p:ext uri="{DCECCB84-F9BA-43D5-87BE-67443E8EF086}">
-      <p15:sldGuideLst xmlns:p15="http://schemas.microsoft.com/office/powerpoint/2012/main"/>
+      <p15:sldGuideLst xmlns:p15="http://schemas.microsoft.com/office/powerpoint/2012/main" xmlns=""/>
     </p:ext>
   </p:extLst>
 </p:sldLayout>
@@ -17191,13 +17191,13 @@
   <p:clrMapOvr>
     <a:masterClrMapping/>
   </p:clrMapOvr>
-  <p:transition>
+  <p:transition xmlns:p14="http://schemas.microsoft.com/office/powerpoint/2010/main">
     <p:fade/>
   </p:transition>
   <p:timing>
     <p:tnLst>
       <p:par>
-        <p:cTn id="1" dur="indefinite" restart="never" nodeType="tmRoot"/>
+        <p:cTn xmlns:p14="http://schemas.microsoft.com/office/powerpoint/2010/main" id="1" dur="indefinite" restart="never" nodeType="tmRoot"/>
       </p:par>
     </p:tnLst>
   </p:timing>
@@ -17343,7 +17343,7 @@
           <a:p>
             <a:fld id="{6653CBBA-7972-0445-94FD-93C194816572}" type="datetime1">
               <a:rPr lang="gsw-FR" smtClean="0"/>
-              <a:t>09/09/2016</a:t>
+              <a:t>09.09.16</a:t>
             </a:fld>
             <a:endParaRPr lang="en-GB" dirty="0"/>
           </a:p>
@@ -17389,7 +17389,7 @@
           <a:p>
             <a:fld id="{6C6AE60A-B69C-4790-82F7-3882EDF23186}" type="slidenum">
               <a:rPr lang="en-GB" smtClean="0"/>
-              <a:t>‹Nr.›</a:t>
+              <a:t>‹#›</a:t>
             </a:fld>
             <a:endParaRPr lang="en-GB" dirty="0"/>
           </a:p>
@@ -17435,13 +17435,13 @@
   <p:clrMapOvr>
     <a:masterClrMapping/>
   </p:clrMapOvr>
-  <p:transition>
+  <p:transition xmlns:p14="http://schemas.microsoft.com/office/powerpoint/2010/main">
     <p:fade/>
   </p:transition>
   <p:timing>
     <p:tnLst>
       <p:par>
-        <p:cTn id="1" dur="indefinite" restart="never" nodeType="tmRoot"/>
+        <p:cTn xmlns:p14="http://schemas.microsoft.com/office/powerpoint/2010/main" id="1" dur="indefinite" restart="never" nodeType="tmRoot"/>
       </p:par>
     </p:tnLst>
   </p:timing>
@@ -17587,7 +17587,7 @@
           <a:p>
             <a:fld id="{ED96B4BA-03A0-6F49-9505-F75E8C7BB164}" type="datetime1">
               <a:rPr lang="gsw-FR" smtClean="0"/>
-              <a:t>09/09/2016</a:t>
+              <a:t>09.09.16</a:t>
             </a:fld>
             <a:endParaRPr lang="en-GB" dirty="0"/>
           </a:p>
@@ -17633,7 +17633,7 @@
           <a:p>
             <a:fld id="{6C6AE60A-B69C-4790-82F7-3882EDF23186}" type="slidenum">
               <a:rPr lang="en-GB" smtClean="0"/>
-              <a:t>‹Nr.›</a:t>
+              <a:t>‹#›</a:t>
             </a:fld>
             <a:endParaRPr lang="en-GB" dirty="0"/>
           </a:p>
@@ -17684,13 +17684,13 @@
   <p:clrMapOvr>
     <a:masterClrMapping/>
   </p:clrMapOvr>
-  <p:transition>
+  <p:transition xmlns:p14="http://schemas.microsoft.com/office/powerpoint/2010/main">
     <p:fade/>
   </p:transition>
   <p:timing>
     <p:tnLst>
       <p:par>
-        <p:cTn id="1" dur="indefinite" restart="never" nodeType="tmRoot"/>
+        <p:cTn xmlns:p14="http://schemas.microsoft.com/office/powerpoint/2010/main" id="1" dur="indefinite" restart="never" nodeType="tmRoot"/>
       </p:par>
     </p:tnLst>
   </p:timing>
@@ -18005,7 +18005,7 @@
           <a:p>
             <a:fld id="{9CA32F73-8587-A74A-8FAE-01C09E504423}" type="datetime1">
               <a:rPr lang="gsw-FR" smtClean="0"/>
-              <a:t>09/09/2016</a:t>
+              <a:t>09.09.16</a:t>
             </a:fld>
             <a:endParaRPr lang="en-GB" dirty="0"/>
           </a:p>
@@ -18051,7 +18051,7 @@
           <a:p>
             <a:fld id="{6C6AE60A-B69C-4790-82F7-3882EDF23186}" type="slidenum">
               <a:rPr lang="en-GB" smtClean="0"/>
-              <a:t>‹Nr.›</a:t>
+              <a:t>‹#›</a:t>
             </a:fld>
             <a:endParaRPr lang="en-GB" dirty="0"/>
           </a:p>
@@ -18102,13 +18102,13 @@
   <p:clrMapOvr>
     <a:masterClrMapping/>
   </p:clrMapOvr>
-  <p:transition>
+  <p:transition xmlns:p14="http://schemas.microsoft.com/office/powerpoint/2010/main">
     <p:fade/>
   </p:transition>
   <p:timing>
     <p:tnLst>
       <p:par>
-        <p:cTn id="1" dur="indefinite" restart="never" nodeType="tmRoot"/>
+        <p:cTn xmlns:p14="http://schemas.microsoft.com/office/powerpoint/2010/main" id="1" dur="indefinite" restart="never" nodeType="tmRoot"/>
       </p:par>
     </p:tnLst>
   </p:timing>
@@ -18149,7 +18149,7 @@
           <a:p>
             <a:fld id="{DDA954CA-8A33-514D-BC26-D8C8592300BB}" type="datetime1">
               <a:rPr lang="gsw-FR" smtClean="0"/>
-              <a:t>09/09/2016</a:t>
+              <a:t>09.09.16</a:t>
             </a:fld>
             <a:endParaRPr lang="en-GB" dirty="0"/>
           </a:p>
@@ -18195,7 +18195,7 @@
           <a:p>
             <a:fld id="{6C6AE60A-B69C-4790-82F7-3882EDF23186}" type="slidenum">
               <a:rPr lang="en-GB" smtClean="0"/>
-              <a:t>‹Nr.›</a:t>
+              <a:t>‹#›</a:t>
             </a:fld>
             <a:endParaRPr lang="en-GB" dirty="0"/>
           </a:p>
@@ -18243,13 +18243,13 @@
   <p:clrMapOvr>
     <a:masterClrMapping/>
   </p:clrMapOvr>
-  <p:transition>
+  <p:transition xmlns:p14="http://schemas.microsoft.com/office/powerpoint/2010/main">
     <p:fade/>
   </p:transition>
   <p:timing>
     <p:tnLst>
       <p:par>
-        <p:cTn id="1" dur="indefinite" restart="never" nodeType="tmRoot"/>
+        <p:cTn xmlns:p14="http://schemas.microsoft.com/office/powerpoint/2010/main" id="1" dur="indefinite" restart="never" nodeType="tmRoot"/>
       </p:par>
     </p:tnLst>
   </p:timing>
@@ -18290,7 +18290,7 @@
           <a:p>
             <a:fld id="{20DAC98F-A570-014A-8542-F74D27EF6270}" type="datetime1">
               <a:rPr lang="gsw-FR" smtClean="0"/>
-              <a:t>09/09/2016</a:t>
+              <a:t>09.09.16</a:t>
             </a:fld>
             <a:endParaRPr lang="en-GB" dirty="0"/>
           </a:p>
@@ -18336,7 +18336,7 @@
           <a:p>
             <a:fld id="{6C6AE60A-B69C-4790-82F7-3882EDF23186}" type="slidenum">
               <a:rPr lang="en-GB" smtClean="0"/>
-              <a:t>‹Nr.›</a:t>
+              <a:t>‹#›</a:t>
             </a:fld>
             <a:endParaRPr lang="en-GB" dirty="0"/>
           </a:p>
@@ -18385,13 +18385,13 @@
   <p:clrMapOvr>
     <a:masterClrMapping/>
   </p:clrMapOvr>
-  <p:transition>
+  <p:transition xmlns:p14="http://schemas.microsoft.com/office/powerpoint/2010/main">
     <p:fade/>
   </p:transition>
   <p:timing>
     <p:tnLst>
       <p:par>
-        <p:cTn id="1" dur="indefinite" restart="never" nodeType="tmRoot"/>
+        <p:cTn xmlns:p14="http://schemas.microsoft.com/office/powerpoint/2010/main" id="1" dur="indefinite" restart="never" nodeType="tmRoot"/>
       </p:par>
     </p:tnLst>
   </p:timing>
@@ -18478,7 +18478,7 @@
           <a:p>
             <a:fld id="{3DCD2D75-D67E-5E4D-BDE3-E116B91D5030}" type="datetime1">
               <a:rPr lang="gsw-FR" smtClean="0"/>
-              <a:t>09/09/2016</a:t>
+              <a:t>09.09.16</a:t>
             </a:fld>
             <a:endParaRPr lang="en-GB" dirty="0"/>
           </a:p>
@@ -18524,7 +18524,7 @@
           <a:p>
             <a:fld id="{6C6AE60A-B69C-4790-82F7-3882EDF23186}" type="slidenum">
               <a:rPr lang="en-GB" smtClean="0"/>
-              <a:t>‹Nr.›</a:t>
+              <a:t>‹#›</a:t>
             </a:fld>
             <a:endParaRPr lang="en-GB" dirty="0"/>
           </a:p>
@@ -18570,13 +18570,13 @@
   <p:clrMapOvr>
     <a:masterClrMapping/>
   </p:clrMapOvr>
-  <p:transition>
+  <p:transition xmlns:p14="http://schemas.microsoft.com/office/powerpoint/2010/main">
     <p:fade/>
   </p:transition>
   <p:timing>
     <p:tnLst>
       <p:par>
-        <p:cTn id="1" dur="indefinite" restart="never" nodeType="tmRoot"/>
+        <p:cTn xmlns:p14="http://schemas.microsoft.com/office/powerpoint/2010/main" id="1" dur="indefinite" restart="never" nodeType="tmRoot"/>
       </p:par>
     </p:tnLst>
   </p:timing>
@@ -18740,7 +18740,7 @@
           <a:p>
             <a:fld id="{AED5B918-73FD-B742-B96F-917DE8EB444D}" type="datetime1">
               <a:rPr lang="gsw-FR" smtClean="0"/>
-              <a:t>09/09/2016</a:t>
+              <a:t>09.09.16</a:t>
             </a:fld>
             <a:endParaRPr lang="en-GB" dirty="0"/>
           </a:p>
@@ -18763,7 +18763,7 @@
           <a:p>
             <a:fld id="{6C6AE60A-B69C-4790-82F7-3882EDF23186}" type="slidenum">
               <a:rPr lang="en-GB" smtClean="0"/>
-              <a:t>‹Nr.›</a:t>
+              <a:t>‹#›</a:t>
             </a:fld>
             <a:endParaRPr lang="en-GB" dirty="0"/>
           </a:p>
@@ -18871,13 +18871,13 @@
   <p:clrMapOvr>
     <a:masterClrMapping/>
   </p:clrMapOvr>
-  <p:transition>
+  <p:transition xmlns:p14="http://schemas.microsoft.com/office/powerpoint/2010/main">
     <p:fade/>
   </p:transition>
   <p:timing>
     <p:tnLst>
       <p:par>
-        <p:cTn id="1" dur="indefinite" restart="never" nodeType="tmRoot"/>
+        <p:cTn xmlns:p14="http://schemas.microsoft.com/office/powerpoint/2010/main" id="1" dur="indefinite" restart="never" nodeType="tmRoot"/>
       </p:par>
     </p:tnLst>
   </p:timing>
@@ -19088,7 +19088,7 @@
           <a:p>
             <a:fld id="{7B7C40A1-DD4D-DE4C-8957-258DFF176B1E}" type="datetime1">
               <a:rPr lang="gsw-FR" smtClean="0"/>
-              <a:t>09/09/2016</a:t>
+              <a:t>09.09.16</a:t>
             </a:fld>
             <a:endParaRPr lang="en-GB" dirty="0"/>
           </a:p>
@@ -19134,7 +19134,7 @@
           <a:p>
             <a:fld id="{6C6AE60A-B69C-4790-82F7-3882EDF23186}" type="slidenum">
               <a:rPr lang="en-GB" smtClean="0"/>
-              <a:t>‹Nr.›</a:t>
+              <a:t>‹#›</a:t>
             </a:fld>
             <a:endParaRPr lang="en-GB" dirty="0"/>
           </a:p>
@@ -19183,13 +19183,13 @@
   <p:clrMapOvr>
     <a:masterClrMapping/>
   </p:clrMapOvr>
-  <p:transition>
+  <p:transition xmlns:p14="http://schemas.microsoft.com/office/powerpoint/2010/main">
     <p:fade/>
   </p:transition>
   <p:timing>
     <p:tnLst>
       <p:par>
-        <p:cTn id="1" dur="indefinite" restart="never" nodeType="tmRoot"/>
+        <p:cTn xmlns:p14="http://schemas.microsoft.com/office/powerpoint/2010/main" id="1" dur="indefinite" restart="never" nodeType="tmRoot"/>
       </p:par>
     </p:tnLst>
   </p:timing>
@@ -19396,7 +19396,7 @@
           <a:p>
             <a:fld id="{E32E6FBD-21A8-4D4E-BB09-C81275CCB65A}" type="datetime1">
               <a:rPr lang="gsw-FR" smtClean="0"/>
-              <a:t>09/09/2016</a:t>
+              <a:t>09.09.16</a:t>
             </a:fld>
             <a:endParaRPr lang="en-GB" dirty="0"/>
           </a:p>
@@ -19442,7 +19442,7 @@
           <a:p>
             <a:fld id="{6C6AE60A-B69C-4790-82F7-3882EDF23186}" type="slidenum">
               <a:rPr lang="en-GB" smtClean="0"/>
-              <a:t>‹Nr.›</a:t>
+              <a:t>‹#›</a:t>
             </a:fld>
             <a:endParaRPr lang="en-GB" dirty="0"/>
           </a:p>
@@ -19491,19 +19491,19 @@
   <p:clrMapOvr>
     <a:masterClrMapping/>
   </p:clrMapOvr>
-  <p:transition>
+  <p:transition xmlns:p14="http://schemas.microsoft.com/office/powerpoint/2010/main">
     <p:fade/>
   </p:transition>
   <p:timing>
     <p:tnLst>
       <p:par>
-        <p:cTn id="1" dur="indefinite" restart="never" nodeType="tmRoot"/>
+        <p:cTn xmlns:p14="http://schemas.microsoft.com/office/powerpoint/2010/main" id="1" dur="indefinite" restart="never" nodeType="tmRoot"/>
       </p:par>
     </p:tnLst>
   </p:timing>
   <p:extLst mod="1">
     <p:ext uri="{DCECCB84-F9BA-43D5-87BE-67443E8EF086}">
-      <p15:sldGuideLst xmlns:p15="http://schemas.microsoft.com/office/powerpoint/2012/main"/>
+      <p15:sldGuideLst xmlns:p15="http://schemas.microsoft.com/office/powerpoint/2012/main" xmlns=""/>
     </p:ext>
   </p:extLst>
 </p:sldLayout>
@@ -20537,13 +20537,13 @@
   <p:clrMapOvr>
     <a:masterClrMapping/>
   </p:clrMapOvr>
-  <p:transition>
+  <p:transition xmlns:p14="http://schemas.microsoft.com/office/powerpoint/2010/main">
     <p:fade/>
   </p:transition>
   <p:timing>
     <p:tnLst>
       <p:par>
-        <p:cTn id="1" dur="indefinite" restart="never" nodeType="tmRoot"/>
+        <p:cTn xmlns:p14="http://schemas.microsoft.com/office/powerpoint/2010/main" id="1" dur="indefinite" restart="never" nodeType="tmRoot"/>
       </p:par>
     </p:tnLst>
   </p:timing>
@@ -20689,7 +20689,7 @@
           <a:p>
             <a:fld id="{653F7641-DFD2-1244-94BE-FDF5EA0813F2}" type="datetime1">
               <a:rPr lang="gsw-FR" smtClean="0"/>
-              <a:t>09/09/2016</a:t>
+              <a:t>09.09.16</a:t>
             </a:fld>
             <a:endParaRPr lang="en-GB" dirty="0"/>
           </a:p>
@@ -20735,7 +20735,7 @@
           <a:p>
             <a:fld id="{6C6AE60A-B69C-4790-82F7-3882EDF23186}" type="slidenum">
               <a:rPr lang="en-GB" smtClean="0"/>
-              <a:t>‹Nr.›</a:t>
+              <a:t>‹#›</a:t>
             </a:fld>
             <a:endParaRPr lang="en-GB" dirty="0"/>
           </a:p>
@@ -20786,13 +20786,13 @@
   <p:clrMapOvr>
     <a:masterClrMapping/>
   </p:clrMapOvr>
-  <p:transition>
+  <p:transition xmlns:p14="http://schemas.microsoft.com/office/powerpoint/2010/main">
     <p:fade/>
   </p:transition>
   <p:timing>
     <p:tnLst>
       <p:par>
-        <p:cTn id="1" dur="indefinite" restart="never" nodeType="tmRoot"/>
+        <p:cTn xmlns:p14="http://schemas.microsoft.com/office/powerpoint/2010/main" id="1" dur="indefinite" restart="never" nodeType="tmRoot"/>
       </p:par>
     </p:tnLst>
   </p:timing>
@@ -21107,7 +21107,7 @@
           <a:p>
             <a:fld id="{24087D13-7130-934A-835D-99E079597B24}" type="datetime1">
               <a:rPr lang="gsw-FR" smtClean="0"/>
-              <a:t>09/09/2016</a:t>
+              <a:t>09.09.16</a:t>
             </a:fld>
             <a:endParaRPr lang="en-GB" dirty="0"/>
           </a:p>
@@ -21153,7 +21153,7 @@
           <a:p>
             <a:fld id="{6C6AE60A-B69C-4790-82F7-3882EDF23186}" type="slidenum">
               <a:rPr lang="en-GB" smtClean="0"/>
-              <a:t>‹Nr.›</a:t>
+              <a:t>‹#›</a:t>
             </a:fld>
             <a:endParaRPr lang="en-GB" dirty="0"/>
           </a:p>
@@ -21199,13 +21199,13 @@
   <p:clrMapOvr>
     <a:masterClrMapping/>
   </p:clrMapOvr>
-  <p:transition>
+  <p:transition xmlns:p14="http://schemas.microsoft.com/office/powerpoint/2010/main">
     <p:fade/>
   </p:transition>
   <p:timing>
     <p:tnLst>
       <p:par>
-        <p:cTn id="1" dur="indefinite" restart="never" nodeType="tmRoot"/>
+        <p:cTn xmlns:p14="http://schemas.microsoft.com/office/powerpoint/2010/main" id="1" dur="indefinite" restart="never" nodeType="tmRoot"/>
       </p:par>
     </p:tnLst>
   </p:timing>
@@ -21520,7 +21520,7 @@
           <a:p>
             <a:fld id="{B9566E2C-D956-7E4E-9B5F-C00DC83E784A}" type="datetime1">
               <a:rPr lang="gsw-FR" smtClean="0"/>
-              <a:t>09/09/2016</a:t>
+              <a:t>09.09.16</a:t>
             </a:fld>
             <a:endParaRPr lang="en-GB" dirty="0"/>
           </a:p>
@@ -21566,7 +21566,7 @@
           <a:p>
             <a:fld id="{6C6AE60A-B69C-4790-82F7-3882EDF23186}" type="slidenum">
               <a:rPr lang="en-GB" smtClean="0"/>
-              <a:t>‹Nr.›</a:t>
+              <a:t>‹#›</a:t>
             </a:fld>
             <a:endParaRPr lang="en-GB" dirty="0"/>
           </a:p>
@@ -21617,13 +21617,13 @@
   <p:clrMapOvr>
     <a:masterClrMapping/>
   </p:clrMapOvr>
-  <p:transition>
+  <p:transition xmlns:p14="http://schemas.microsoft.com/office/powerpoint/2010/main">
     <p:fade/>
   </p:transition>
   <p:timing>
     <p:tnLst>
       <p:par>
-        <p:cTn id="1" dur="indefinite" restart="never" nodeType="tmRoot"/>
+        <p:cTn xmlns:p14="http://schemas.microsoft.com/office/powerpoint/2010/main" id="1" dur="indefinite" restart="never" nodeType="tmRoot"/>
       </p:par>
     </p:tnLst>
   </p:timing>
@@ -21664,7 +21664,7 @@
           <a:p>
             <a:fld id="{CF058D02-AA03-C84B-BACD-56B67EAF29C5}" type="datetime1">
               <a:rPr lang="gsw-FR" smtClean="0"/>
-              <a:t>09/09/2016</a:t>
+              <a:t>09.09.16</a:t>
             </a:fld>
             <a:endParaRPr lang="en-GB" dirty="0"/>
           </a:p>
@@ -21710,7 +21710,7 @@
           <a:p>
             <a:fld id="{6C6AE60A-B69C-4790-82F7-3882EDF23186}" type="slidenum">
               <a:rPr lang="en-GB" smtClean="0"/>
-              <a:t>‹Nr.›</a:t>
+              <a:t>‹#›</a:t>
             </a:fld>
             <a:endParaRPr lang="en-GB" dirty="0"/>
           </a:p>
@@ -21758,13 +21758,13 @@
   <p:clrMapOvr>
     <a:masterClrMapping/>
   </p:clrMapOvr>
-  <p:transition>
+  <p:transition xmlns:p14="http://schemas.microsoft.com/office/powerpoint/2010/main">
     <p:fade/>
   </p:transition>
   <p:timing>
     <p:tnLst>
       <p:par>
-        <p:cTn id="1" dur="indefinite" restart="never" nodeType="tmRoot"/>
+        <p:cTn xmlns:p14="http://schemas.microsoft.com/office/powerpoint/2010/main" id="1" dur="indefinite" restart="never" nodeType="tmRoot"/>
       </p:par>
     </p:tnLst>
   </p:timing>
@@ -21805,7 +21805,7 @@
           <a:p>
             <a:fld id="{072A9AC9-4BA1-834F-A1D5-1FEE5C658E3E}" type="datetime1">
               <a:rPr lang="gsw-FR" smtClean="0"/>
-              <a:t>09/09/2016</a:t>
+              <a:t>09.09.16</a:t>
             </a:fld>
             <a:endParaRPr lang="en-GB" dirty="0"/>
           </a:p>
@@ -21851,7 +21851,7 @@
           <a:p>
             <a:fld id="{6C6AE60A-B69C-4790-82F7-3882EDF23186}" type="slidenum">
               <a:rPr lang="en-GB" smtClean="0"/>
-              <a:t>‹Nr.›</a:t>
+              <a:t>‹#›</a:t>
             </a:fld>
             <a:endParaRPr lang="en-GB" dirty="0"/>
           </a:p>
@@ -21900,13 +21900,13 @@
   <p:clrMapOvr>
     <a:masterClrMapping/>
   </p:clrMapOvr>
-  <p:transition>
+  <p:transition xmlns:p14="http://schemas.microsoft.com/office/powerpoint/2010/main">
     <p:fade/>
   </p:transition>
   <p:timing>
     <p:tnLst>
       <p:par>
-        <p:cTn id="1" dur="indefinite" restart="never" nodeType="tmRoot"/>
+        <p:cTn xmlns:p14="http://schemas.microsoft.com/office/powerpoint/2010/main" id="1" dur="indefinite" restart="never" nodeType="tmRoot"/>
       </p:par>
     </p:tnLst>
   </p:timing>
@@ -21993,7 +21993,7 @@
           <a:p>
             <a:fld id="{06F4C9BC-5E35-2040-A6A4-F0409364FA53}" type="datetime1">
               <a:rPr lang="gsw-FR" smtClean="0"/>
-              <a:t>09/09/2016</a:t>
+              <a:t>09.09.16</a:t>
             </a:fld>
             <a:endParaRPr lang="en-GB" dirty="0"/>
           </a:p>
@@ -22039,7 +22039,7 @@
           <a:p>
             <a:fld id="{6C6AE60A-B69C-4790-82F7-3882EDF23186}" type="slidenum">
               <a:rPr lang="en-GB" smtClean="0"/>
-              <a:t>‹Nr.›</a:t>
+              <a:t>‹#›</a:t>
             </a:fld>
             <a:endParaRPr lang="en-GB" dirty="0"/>
           </a:p>
@@ -22085,13 +22085,13 @@
   <p:clrMapOvr>
     <a:masterClrMapping/>
   </p:clrMapOvr>
-  <p:transition>
+  <p:transition xmlns:p14="http://schemas.microsoft.com/office/powerpoint/2010/main">
     <p:fade/>
   </p:transition>
   <p:timing>
     <p:tnLst>
       <p:par>
-        <p:cTn id="1" dur="indefinite" restart="never" nodeType="tmRoot"/>
+        <p:cTn xmlns:p14="http://schemas.microsoft.com/office/powerpoint/2010/main" id="1" dur="indefinite" restart="never" nodeType="tmRoot"/>
       </p:par>
     </p:tnLst>
   </p:timing>
@@ -22255,7 +22255,7 @@
           <a:p>
             <a:fld id="{B1598C20-43F9-2E48-BFA7-398B9E11D2AF}" type="datetime1">
               <a:rPr lang="gsw-FR" smtClean="0"/>
-              <a:t>09/09/2016</a:t>
+              <a:t>09.09.16</a:t>
             </a:fld>
             <a:endParaRPr lang="en-GB" dirty="0"/>
           </a:p>
@@ -22278,7 +22278,7 @@
           <a:p>
             <a:fld id="{6C6AE60A-B69C-4790-82F7-3882EDF23186}" type="slidenum">
               <a:rPr lang="en-GB" smtClean="0"/>
-              <a:t>‹Nr.›</a:t>
+              <a:t>‹#›</a:t>
             </a:fld>
             <a:endParaRPr lang="en-GB" dirty="0"/>
           </a:p>
@@ -22386,13 +22386,13 @@
   <p:clrMapOvr>
     <a:masterClrMapping/>
   </p:clrMapOvr>
-  <p:transition>
+  <p:transition xmlns:p14="http://schemas.microsoft.com/office/powerpoint/2010/main">
     <p:fade/>
   </p:transition>
   <p:timing>
     <p:tnLst>
       <p:par>
-        <p:cTn id="1" dur="indefinite" restart="never" nodeType="tmRoot"/>
+        <p:cTn xmlns:p14="http://schemas.microsoft.com/office/powerpoint/2010/main" id="1" dur="indefinite" restart="never" nodeType="tmRoot"/>
       </p:par>
     </p:tnLst>
   </p:timing>
@@ -22603,7 +22603,7 @@
           <a:p>
             <a:fld id="{0A096ADD-C04D-2143-B3F0-7CFB524BEB1E}" type="datetime1">
               <a:rPr lang="gsw-FR" smtClean="0"/>
-              <a:t>09/09/2016</a:t>
+              <a:t>09.09.16</a:t>
             </a:fld>
             <a:endParaRPr lang="en-GB" dirty="0"/>
           </a:p>
@@ -22649,7 +22649,7 @@
           <a:p>
             <a:fld id="{6C6AE60A-B69C-4790-82F7-3882EDF23186}" type="slidenum">
               <a:rPr lang="en-GB" smtClean="0"/>
-              <a:t>‹Nr.›</a:t>
+              <a:t>‹#›</a:t>
             </a:fld>
             <a:endParaRPr lang="en-GB" dirty="0"/>
           </a:p>
@@ -22698,13 +22698,13 @@
   <p:clrMapOvr>
     <a:masterClrMapping/>
   </p:clrMapOvr>
-  <p:transition>
+  <p:transition xmlns:p14="http://schemas.microsoft.com/office/powerpoint/2010/main">
     <p:fade/>
   </p:transition>
   <p:timing>
     <p:tnLst>
       <p:par>
-        <p:cTn id="1" dur="indefinite" restart="never" nodeType="tmRoot"/>
+        <p:cTn xmlns:p14="http://schemas.microsoft.com/office/powerpoint/2010/main" id="1" dur="indefinite" restart="never" nodeType="tmRoot"/>
       </p:par>
     </p:tnLst>
   </p:timing>
@@ -22911,7 +22911,7 @@
           <a:p>
             <a:fld id="{2A87547F-DDF8-B241-A4E4-CFB08049371A}" type="datetime1">
               <a:rPr lang="gsw-FR" smtClean="0"/>
-              <a:t>09/09/2016</a:t>
+              <a:t>09.09.16</a:t>
             </a:fld>
             <a:endParaRPr lang="en-GB" dirty="0"/>
           </a:p>
@@ -22957,7 +22957,7 @@
           <a:p>
             <a:fld id="{6C6AE60A-B69C-4790-82F7-3882EDF23186}" type="slidenum">
               <a:rPr lang="en-GB" smtClean="0"/>
-              <a:t>‹Nr.›</a:t>
+              <a:t>‹#›</a:t>
             </a:fld>
             <a:endParaRPr lang="en-GB" dirty="0"/>
           </a:p>
@@ -23006,19 +23006,19 @@
   <p:clrMapOvr>
     <a:masterClrMapping/>
   </p:clrMapOvr>
-  <p:transition>
+  <p:transition xmlns:p14="http://schemas.microsoft.com/office/powerpoint/2010/main">
     <p:fade/>
   </p:transition>
   <p:timing>
     <p:tnLst>
       <p:par>
-        <p:cTn id="1" dur="indefinite" restart="never" nodeType="tmRoot"/>
+        <p:cTn xmlns:p14="http://schemas.microsoft.com/office/powerpoint/2010/main" id="1" dur="indefinite" restart="never" nodeType="tmRoot"/>
       </p:par>
     </p:tnLst>
   </p:timing>
   <p:extLst mod="1">
     <p:ext uri="{DCECCB84-F9BA-43D5-87BE-67443E8EF086}">
-      <p15:sldGuideLst xmlns:p15="http://schemas.microsoft.com/office/powerpoint/2012/main"/>
+      <p15:sldGuideLst xmlns:p15="http://schemas.microsoft.com/office/powerpoint/2012/main" xmlns=""/>
     </p:ext>
   </p:extLst>
 </p:sldLayout>
@@ -24052,13 +24052,13 @@
   <p:clrMapOvr>
     <a:masterClrMapping/>
   </p:clrMapOvr>
-  <p:transition>
+  <p:transition xmlns:p14="http://schemas.microsoft.com/office/powerpoint/2010/main">
     <p:fade/>
   </p:transition>
   <p:timing>
     <p:tnLst>
       <p:par>
-        <p:cTn id="1" dur="indefinite" restart="never" nodeType="tmRoot"/>
+        <p:cTn xmlns:p14="http://schemas.microsoft.com/office/powerpoint/2010/main" id="1" dur="indefinite" restart="never" nodeType="tmRoot"/>
       </p:par>
     </p:tnLst>
   </p:timing>
@@ -24204,7 +24204,7 @@
           <a:p>
             <a:fld id="{FE503C79-28E7-FC4F-BF7C-BA2208A3EBA8}" type="datetime1">
               <a:rPr lang="gsw-FR" smtClean="0"/>
-              <a:t>09/09/2016</a:t>
+              <a:t>09.09.16</a:t>
             </a:fld>
             <a:endParaRPr lang="en-GB" dirty="0"/>
           </a:p>
@@ -24250,7 +24250,7 @@
           <a:p>
             <a:fld id="{6C6AE60A-B69C-4790-82F7-3882EDF23186}" type="slidenum">
               <a:rPr lang="en-GB" smtClean="0"/>
-              <a:t>‹Nr.›</a:t>
+              <a:t>‹#›</a:t>
             </a:fld>
             <a:endParaRPr lang="en-GB" dirty="0"/>
           </a:p>
@@ -24301,13 +24301,13 @@
   <p:clrMapOvr>
     <a:masterClrMapping/>
   </p:clrMapOvr>
-  <p:transition>
+  <p:transition xmlns:p14="http://schemas.microsoft.com/office/powerpoint/2010/main">
     <p:fade/>
   </p:transition>
   <p:timing>
     <p:tnLst>
       <p:par>
-        <p:cTn id="1" dur="indefinite" restart="never" nodeType="tmRoot"/>
+        <p:cTn xmlns:p14="http://schemas.microsoft.com/office/powerpoint/2010/main" id="1" dur="indefinite" restart="never" nodeType="tmRoot"/>
       </p:par>
     </p:tnLst>
   </p:timing>
@@ -24622,7 +24622,7 @@
           <a:p>
             <a:fld id="{15586EC6-C98B-E44A-BC9B-A74CEB74D16C}" type="datetime1">
               <a:rPr lang="gsw-FR" smtClean="0"/>
-              <a:t>09/09/2016</a:t>
+              <a:t>09.09.16</a:t>
             </a:fld>
             <a:endParaRPr lang="en-GB" dirty="0"/>
           </a:p>
@@ -24668,7 +24668,7 @@
           <a:p>
             <a:fld id="{6C6AE60A-B69C-4790-82F7-3882EDF23186}" type="slidenum">
               <a:rPr lang="en-GB" smtClean="0"/>
-              <a:t>‹Nr.›</a:t>
+              <a:t>‹#›</a:t>
             </a:fld>
             <a:endParaRPr lang="en-GB" dirty="0"/>
           </a:p>
@@ -24719,13 +24719,13 @@
   <p:clrMapOvr>
     <a:masterClrMapping/>
   </p:clrMapOvr>
-  <p:transition>
+  <p:transition xmlns:p14="http://schemas.microsoft.com/office/powerpoint/2010/main">
     <p:fade/>
   </p:transition>
   <p:timing>
     <p:tnLst>
       <p:par>
-        <p:cTn id="1" dur="indefinite" restart="never" nodeType="tmRoot"/>
+        <p:cTn xmlns:p14="http://schemas.microsoft.com/office/powerpoint/2010/main" id="1" dur="indefinite" restart="never" nodeType="tmRoot"/>
       </p:par>
     </p:tnLst>
   </p:timing>
@@ -24766,7 +24766,7 @@
           <a:p>
             <a:fld id="{EB19BE82-DD3C-DE4B-A843-EC62550775E6}" type="datetime1">
               <a:rPr lang="gsw-FR" smtClean="0"/>
-              <a:t>09/09/2016</a:t>
+              <a:t>09.09.16</a:t>
             </a:fld>
             <a:endParaRPr lang="en-GB" dirty="0"/>
           </a:p>
@@ -24812,7 +24812,7 @@
           <a:p>
             <a:fld id="{6C6AE60A-B69C-4790-82F7-3882EDF23186}" type="slidenum">
               <a:rPr lang="en-GB" smtClean="0"/>
-              <a:t>‹Nr.›</a:t>
+              <a:t>‹#›</a:t>
             </a:fld>
             <a:endParaRPr lang="en-GB" dirty="0"/>
           </a:p>
@@ -24855,13 +24855,13 @@
   <p:clrMapOvr>
     <a:masterClrMapping/>
   </p:clrMapOvr>
-  <p:transition>
+  <p:transition xmlns:p14="http://schemas.microsoft.com/office/powerpoint/2010/main">
     <p:fade/>
   </p:transition>
   <p:timing>
     <p:tnLst>
       <p:par>
-        <p:cTn id="1" dur="indefinite" restart="never" nodeType="tmRoot"/>
+        <p:cTn xmlns:p14="http://schemas.microsoft.com/office/powerpoint/2010/main" id="1" dur="indefinite" restart="never" nodeType="tmRoot"/>
       </p:par>
     </p:tnLst>
   </p:timing>
@@ -24902,7 +24902,7 @@
           <a:p>
             <a:fld id="{B793852F-6EAE-F646-B9F0-B80DDB2CC342}" type="datetime1">
               <a:rPr lang="gsw-FR" smtClean="0"/>
-              <a:t>09/09/2016</a:t>
+              <a:t>09.09.16</a:t>
             </a:fld>
             <a:endParaRPr lang="en-GB" dirty="0"/>
           </a:p>
@@ -24948,7 +24948,7 @@
           <a:p>
             <a:fld id="{6C6AE60A-B69C-4790-82F7-3882EDF23186}" type="slidenum">
               <a:rPr lang="en-GB" smtClean="0"/>
-              <a:t>‹Nr.›</a:t>
+              <a:t>‹#›</a:t>
             </a:fld>
             <a:endParaRPr lang="en-GB" dirty="0"/>
           </a:p>
@@ -24996,13 +24996,13 @@
   <p:clrMapOvr>
     <a:masterClrMapping/>
   </p:clrMapOvr>
-  <p:transition>
+  <p:transition xmlns:p14="http://schemas.microsoft.com/office/powerpoint/2010/main">
     <p:fade/>
   </p:transition>
   <p:timing>
     <p:tnLst>
       <p:par>
-        <p:cTn id="1" dur="indefinite" restart="never" nodeType="tmRoot"/>
+        <p:cTn xmlns:p14="http://schemas.microsoft.com/office/powerpoint/2010/main" id="1" dur="indefinite" restart="never" nodeType="tmRoot"/>
       </p:par>
     </p:tnLst>
   </p:timing>
@@ -25043,7 +25043,7 @@
           <a:p>
             <a:fld id="{B78213A5-E2B4-634B-9D9F-ABA204452866}" type="datetime1">
               <a:rPr lang="gsw-FR" smtClean="0"/>
-              <a:t>09/09/2016</a:t>
+              <a:t>09.09.16</a:t>
             </a:fld>
             <a:endParaRPr lang="en-GB" dirty="0"/>
           </a:p>
@@ -25089,7 +25089,7 @@
           <a:p>
             <a:fld id="{6C6AE60A-B69C-4790-82F7-3882EDF23186}" type="slidenum">
               <a:rPr lang="en-GB" smtClean="0"/>
-              <a:t>‹Nr.›</a:t>
+              <a:t>‹#›</a:t>
             </a:fld>
             <a:endParaRPr lang="en-GB" dirty="0"/>
           </a:p>
@@ -25138,13 +25138,13 @@
   <p:clrMapOvr>
     <a:masterClrMapping/>
   </p:clrMapOvr>
-  <p:transition>
+  <p:transition xmlns:p14="http://schemas.microsoft.com/office/powerpoint/2010/main">
     <p:fade/>
   </p:transition>
   <p:timing>
     <p:tnLst>
       <p:par>
-        <p:cTn id="1" dur="indefinite" restart="never" nodeType="tmRoot"/>
+        <p:cTn xmlns:p14="http://schemas.microsoft.com/office/powerpoint/2010/main" id="1" dur="indefinite" restart="never" nodeType="tmRoot"/>
       </p:par>
     </p:tnLst>
   </p:timing>
@@ -25231,7 +25231,7 @@
           <a:p>
             <a:fld id="{FEA3A7DA-1B5B-4547-96AA-9FEBF288CD69}" type="datetime1">
               <a:rPr lang="gsw-FR" smtClean="0"/>
-              <a:t>09/09/2016</a:t>
+              <a:t>09.09.16</a:t>
             </a:fld>
             <a:endParaRPr lang="en-GB" dirty="0"/>
           </a:p>
@@ -25277,7 +25277,7 @@
           <a:p>
             <a:fld id="{6C6AE60A-B69C-4790-82F7-3882EDF23186}" type="slidenum">
               <a:rPr lang="en-GB" smtClean="0"/>
-              <a:t>‹Nr.›</a:t>
+              <a:t>‹#›</a:t>
             </a:fld>
             <a:endParaRPr lang="en-GB" dirty="0"/>
           </a:p>
@@ -25323,13 +25323,13 @@
   <p:clrMapOvr>
     <a:masterClrMapping/>
   </p:clrMapOvr>
-  <p:transition>
+  <p:transition xmlns:p14="http://schemas.microsoft.com/office/powerpoint/2010/main">
     <p:fade/>
   </p:transition>
   <p:timing>
     <p:tnLst>
       <p:par>
-        <p:cTn id="1" dur="indefinite" restart="never" nodeType="tmRoot"/>
+        <p:cTn xmlns:p14="http://schemas.microsoft.com/office/powerpoint/2010/main" id="1" dur="indefinite" restart="never" nodeType="tmRoot"/>
       </p:par>
     </p:tnLst>
   </p:timing>
@@ -25493,7 +25493,7 @@
           <a:p>
             <a:fld id="{93427F74-A5B8-BC43-AC5D-759F18E2CFAB}" type="datetime1">
               <a:rPr lang="gsw-FR" smtClean="0"/>
-              <a:t>09/09/2016</a:t>
+              <a:t>09.09.16</a:t>
             </a:fld>
             <a:endParaRPr lang="en-GB" dirty="0"/>
           </a:p>
@@ -25516,7 +25516,7 @@
           <a:p>
             <a:fld id="{6C6AE60A-B69C-4790-82F7-3882EDF23186}" type="slidenum">
               <a:rPr lang="en-GB" smtClean="0"/>
-              <a:t>‹Nr.›</a:t>
+              <a:t>‹#›</a:t>
             </a:fld>
             <a:endParaRPr lang="en-GB" dirty="0"/>
           </a:p>
@@ -25624,13 +25624,13 @@
   <p:clrMapOvr>
     <a:masterClrMapping/>
   </p:clrMapOvr>
-  <p:transition>
+  <p:transition xmlns:p14="http://schemas.microsoft.com/office/powerpoint/2010/main">
     <p:fade/>
   </p:transition>
   <p:timing>
     <p:tnLst>
       <p:par>
-        <p:cTn id="1" dur="indefinite" restart="never" nodeType="tmRoot"/>
+        <p:cTn xmlns:p14="http://schemas.microsoft.com/office/powerpoint/2010/main" id="1" dur="indefinite" restart="never" nodeType="tmRoot"/>
       </p:par>
     </p:tnLst>
   </p:timing>
@@ -25841,7 +25841,7 @@
           <a:p>
             <a:fld id="{F6A20967-3C13-5040-AFDB-077F2C1E67A7}" type="datetime1">
               <a:rPr lang="gsw-FR" smtClean="0"/>
-              <a:t>09/09/2016</a:t>
+              <a:t>09.09.16</a:t>
             </a:fld>
             <a:endParaRPr lang="en-GB" dirty="0"/>
           </a:p>
@@ -25887,7 +25887,7 @@
           <a:p>
             <a:fld id="{6C6AE60A-B69C-4790-82F7-3882EDF23186}" type="slidenum">
               <a:rPr lang="en-GB" smtClean="0"/>
-              <a:t>‹Nr.›</a:t>
+              <a:t>‹#›</a:t>
             </a:fld>
             <a:endParaRPr lang="en-GB" dirty="0"/>
           </a:p>
@@ -25936,13 +25936,13 @@
   <p:clrMapOvr>
     <a:masterClrMapping/>
   </p:clrMapOvr>
-  <p:transition>
+  <p:transition xmlns:p14="http://schemas.microsoft.com/office/powerpoint/2010/main">
     <p:fade/>
   </p:transition>
   <p:timing>
     <p:tnLst>
       <p:par>
-        <p:cTn id="1" dur="indefinite" restart="never" nodeType="tmRoot"/>
+        <p:cTn xmlns:p14="http://schemas.microsoft.com/office/powerpoint/2010/main" id="1" dur="indefinite" restart="never" nodeType="tmRoot"/>
       </p:par>
     </p:tnLst>
   </p:timing>
@@ -26149,7 +26149,7 @@
           <a:p>
             <a:fld id="{A3CB0D4D-3749-814B-BF17-E4378A6A67BC}" type="datetime1">
               <a:rPr lang="gsw-FR" smtClean="0"/>
-              <a:t>09/09/2016</a:t>
+              <a:t>09.09.16</a:t>
             </a:fld>
             <a:endParaRPr lang="en-GB" dirty="0"/>
           </a:p>
@@ -26195,7 +26195,7 @@
           <a:p>
             <a:fld id="{6C6AE60A-B69C-4790-82F7-3882EDF23186}" type="slidenum">
               <a:rPr lang="en-GB" smtClean="0"/>
-              <a:t>‹Nr.›</a:t>
+              <a:t>‹#›</a:t>
             </a:fld>
             <a:endParaRPr lang="en-GB" dirty="0"/>
           </a:p>
@@ -26244,19 +26244,19 @@
   <p:clrMapOvr>
     <a:masterClrMapping/>
   </p:clrMapOvr>
-  <p:transition>
+  <p:transition xmlns:p14="http://schemas.microsoft.com/office/powerpoint/2010/main">
     <p:fade/>
   </p:transition>
   <p:timing>
     <p:tnLst>
       <p:par>
-        <p:cTn id="1" dur="indefinite" restart="never" nodeType="tmRoot"/>
+        <p:cTn xmlns:p14="http://schemas.microsoft.com/office/powerpoint/2010/main" id="1" dur="indefinite" restart="never" nodeType="tmRoot"/>
       </p:par>
     </p:tnLst>
   </p:timing>
   <p:extLst mod="1">
     <p:ext uri="{DCECCB84-F9BA-43D5-87BE-67443E8EF086}">
-      <p15:sldGuideLst xmlns:p15="http://schemas.microsoft.com/office/powerpoint/2012/main"/>
+      <p15:sldGuideLst xmlns:p15="http://schemas.microsoft.com/office/powerpoint/2012/main" xmlns=""/>
     </p:ext>
   </p:extLst>
 </p:sldLayout>
@@ -27290,13 +27290,13 @@
   <p:clrMapOvr>
     <a:masterClrMapping/>
   </p:clrMapOvr>
-  <p:transition>
+  <p:transition xmlns:p14="http://schemas.microsoft.com/office/powerpoint/2010/main">
     <p:fade/>
   </p:transition>
   <p:timing>
     <p:tnLst>
       <p:par>
-        <p:cTn id="1" dur="indefinite" restart="never" nodeType="tmRoot"/>
+        <p:cTn xmlns:p14="http://schemas.microsoft.com/office/powerpoint/2010/main" id="1" dur="indefinite" restart="never" nodeType="tmRoot"/>
       </p:par>
     </p:tnLst>
   </p:timing>
@@ -27442,7 +27442,7 @@
           <a:p>
             <a:fld id="{02691B74-F17C-654A-8C37-32AF71A205B5}" type="datetime1">
               <a:rPr lang="gsw-FR" smtClean="0"/>
-              <a:t>09/09/2016</a:t>
+              <a:t>09.09.16</a:t>
             </a:fld>
             <a:endParaRPr lang="en-GB" dirty="0"/>
           </a:p>
@@ -27488,7 +27488,7 @@
           <a:p>
             <a:fld id="{6C6AE60A-B69C-4790-82F7-3882EDF23186}" type="slidenum">
               <a:rPr lang="en-GB" smtClean="0"/>
-              <a:t>‹Nr.›</a:t>
+              <a:t>‹#›</a:t>
             </a:fld>
             <a:endParaRPr lang="en-GB" dirty="0"/>
           </a:p>
@@ -27539,13 +27539,13 @@
   <p:clrMapOvr>
     <a:masterClrMapping/>
   </p:clrMapOvr>
-  <p:transition>
+  <p:transition xmlns:p14="http://schemas.microsoft.com/office/powerpoint/2010/main">
     <p:fade/>
   </p:transition>
   <p:timing>
     <p:tnLst>
       <p:par>
-        <p:cTn id="1" dur="indefinite" restart="never" nodeType="tmRoot"/>
+        <p:cTn xmlns:p14="http://schemas.microsoft.com/office/powerpoint/2010/main" id="1" dur="indefinite" restart="never" nodeType="tmRoot"/>
       </p:par>
     </p:tnLst>
   </p:timing>
@@ -27860,7 +27860,7 @@
           <a:p>
             <a:fld id="{52A89517-108E-6348-B434-D8018E7D3EAB}" type="datetime1">
               <a:rPr lang="gsw-FR" smtClean="0"/>
-              <a:t>09/09/2016</a:t>
+              <a:t>09.09.16</a:t>
             </a:fld>
             <a:endParaRPr lang="en-GB" dirty="0"/>
           </a:p>
@@ -27906,7 +27906,7 @@
           <a:p>
             <a:fld id="{6C6AE60A-B69C-4790-82F7-3882EDF23186}" type="slidenum">
               <a:rPr lang="en-GB" smtClean="0"/>
-              <a:t>‹Nr.›</a:t>
+              <a:t>‹#›</a:t>
             </a:fld>
             <a:endParaRPr lang="en-GB" dirty="0"/>
           </a:p>
@@ -27957,13 +27957,13 @@
   <p:clrMapOvr>
     <a:masterClrMapping/>
   </p:clrMapOvr>
-  <p:transition>
+  <p:transition xmlns:p14="http://schemas.microsoft.com/office/powerpoint/2010/main">
     <p:fade/>
   </p:transition>
   <p:timing>
     <p:tnLst>
       <p:par>
-        <p:cTn id="1" dur="indefinite" restart="never" nodeType="tmRoot"/>
+        <p:cTn xmlns:p14="http://schemas.microsoft.com/office/powerpoint/2010/main" id="1" dur="indefinite" restart="never" nodeType="tmRoot"/>
       </p:par>
     </p:tnLst>
   </p:timing>
@@ -28004,7 +28004,7 @@
           <a:p>
             <a:fld id="{48D9CE49-8379-1142-85F6-6F81440EF952}" type="datetime1">
               <a:rPr lang="gsw-FR" smtClean="0"/>
-              <a:t>09/09/2016</a:t>
+              <a:t>09.09.16</a:t>
             </a:fld>
             <a:endParaRPr lang="en-GB" dirty="0"/>
           </a:p>
@@ -28050,7 +28050,7 @@
           <a:p>
             <a:fld id="{6C6AE60A-B69C-4790-82F7-3882EDF23186}" type="slidenum">
               <a:rPr lang="en-GB" smtClean="0"/>
-              <a:t>‹Nr.›</a:t>
+              <a:t>‹#›</a:t>
             </a:fld>
             <a:endParaRPr lang="en-GB" dirty="0"/>
           </a:p>
@@ -28098,13 +28098,13 @@
   <p:clrMapOvr>
     <a:masterClrMapping/>
   </p:clrMapOvr>
-  <p:transition>
+  <p:transition xmlns:p14="http://schemas.microsoft.com/office/powerpoint/2010/main">
     <p:fade/>
   </p:transition>
   <p:timing>
     <p:tnLst>
       <p:par>
-        <p:cTn id="1" dur="indefinite" restart="never" nodeType="tmRoot"/>
+        <p:cTn xmlns:p14="http://schemas.microsoft.com/office/powerpoint/2010/main" id="1" dur="indefinite" restart="never" nodeType="tmRoot"/>
       </p:par>
     </p:tnLst>
   </p:timing>
@@ -28145,7 +28145,7 @@
           <a:p>
             <a:fld id="{86B5BCF5-52DA-5A48-B1A4-B0CBBFCB5F2E}" type="datetime1">
               <a:rPr lang="gsw-FR" smtClean="0"/>
-              <a:t>09/09/2016</a:t>
+              <a:t>09.09.16</a:t>
             </a:fld>
             <a:endParaRPr lang="en-GB" dirty="0"/>
           </a:p>
@@ -28191,7 +28191,7 @@
           <a:p>
             <a:fld id="{6C6AE60A-B69C-4790-82F7-3882EDF23186}" type="slidenum">
               <a:rPr lang="en-GB" smtClean="0"/>
-              <a:t>‹Nr.›</a:t>
+              <a:t>‹#›</a:t>
             </a:fld>
             <a:endParaRPr lang="en-GB" dirty="0"/>
           </a:p>
@@ -28240,13 +28240,13 @@
   <p:clrMapOvr>
     <a:masterClrMapping/>
   </p:clrMapOvr>
-  <p:transition>
+  <p:transition xmlns:p14="http://schemas.microsoft.com/office/powerpoint/2010/main">
     <p:fade/>
   </p:transition>
   <p:timing>
     <p:tnLst>
       <p:par>
-        <p:cTn id="1" dur="indefinite" restart="never" nodeType="tmRoot"/>
+        <p:cTn xmlns:p14="http://schemas.microsoft.com/office/powerpoint/2010/main" id="1" dur="indefinite" restart="never" nodeType="tmRoot"/>
       </p:par>
     </p:tnLst>
   </p:timing>
@@ -28287,7 +28287,7 @@
           <a:p>
             <a:fld id="{C7CD73DD-409C-0341-B094-529CEF3A7674}" type="datetime1">
               <a:rPr lang="gsw-FR" smtClean="0"/>
-              <a:t>09/09/2016</a:t>
+              <a:t>09.09.16</a:t>
             </a:fld>
             <a:endParaRPr lang="en-GB" dirty="0"/>
           </a:p>
@@ -28333,7 +28333,7 @@
           <a:p>
             <a:fld id="{6C6AE60A-B69C-4790-82F7-3882EDF23186}" type="slidenum">
               <a:rPr lang="en-GB" smtClean="0"/>
-              <a:t>‹Nr.›</a:t>
+              <a:t>‹#›</a:t>
             </a:fld>
             <a:endParaRPr lang="en-GB" dirty="0"/>
           </a:p>
@@ -28382,13 +28382,13 @@
   <p:clrMapOvr>
     <a:masterClrMapping/>
   </p:clrMapOvr>
-  <p:transition>
+  <p:transition xmlns:p14="http://schemas.microsoft.com/office/powerpoint/2010/main">
     <p:fade/>
   </p:transition>
   <p:timing>
     <p:tnLst>
       <p:par>
-        <p:cTn id="1" dur="indefinite" restart="never" nodeType="tmRoot"/>
+        <p:cTn xmlns:p14="http://schemas.microsoft.com/office/powerpoint/2010/main" id="1" dur="indefinite" restart="never" nodeType="tmRoot"/>
       </p:par>
     </p:tnLst>
   </p:timing>
@@ -28475,7 +28475,7 @@
           <a:p>
             <a:fld id="{2C46E3A0-6512-8E4C-AE9D-42A504FA7EDC}" type="datetime1">
               <a:rPr lang="gsw-FR" smtClean="0"/>
-              <a:t>09/09/2016</a:t>
+              <a:t>09.09.16</a:t>
             </a:fld>
             <a:endParaRPr lang="en-GB" dirty="0"/>
           </a:p>
@@ -28521,7 +28521,7 @@
           <a:p>
             <a:fld id="{6C6AE60A-B69C-4790-82F7-3882EDF23186}" type="slidenum">
               <a:rPr lang="en-GB" smtClean="0"/>
-              <a:t>‹Nr.›</a:t>
+              <a:t>‹#›</a:t>
             </a:fld>
             <a:endParaRPr lang="en-GB" dirty="0"/>
           </a:p>
@@ -28567,13 +28567,13 @@
   <p:clrMapOvr>
     <a:masterClrMapping/>
   </p:clrMapOvr>
-  <p:transition>
+  <p:transition xmlns:p14="http://schemas.microsoft.com/office/powerpoint/2010/main">
     <p:fade/>
   </p:transition>
   <p:timing>
     <p:tnLst>
       <p:par>
-        <p:cTn id="1" dur="indefinite" restart="never" nodeType="tmRoot"/>
+        <p:cTn xmlns:p14="http://schemas.microsoft.com/office/powerpoint/2010/main" id="1" dur="indefinite" restart="never" nodeType="tmRoot"/>
       </p:par>
     </p:tnLst>
   </p:timing>
@@ -28660,7 +28660,7 @@
           <a:p>
             <a:fld id="{A15BCEBB-792C-614C-9595-A3A4696DF18E}" type="datetime1">
               <a:rPr lang="gsw-FR" smtClean="0"/>
-              <a:t>09/09/2016</a:t>
+              <a:t>09.09.16</a:t>
             </a:fld>
             <a:endParaRPr lang="en-GB" dirty="0"/>
           </a:p>
@@ -28706,7 +28706,7 @@
           <a:p>
             <a:fld id="{6C6AE60A-B69C-4790-82F7-3882EDF23186}" type="slidenum">
               <a:rPr lang="en-GB" smtClean="0"/>
-              <a:t>‹Nr.›</a:t>
+              <a:t>‹#›</a:t>
             </a:fld>
             <a:endParaRPr lang="en-GB" dirty="0"/>
           </a:p>
@@ -28752,13 +28752,13 @@
   <p:clrMapOvr>
     <a:masterClrMapping/>
   </p:clrMapOvr>
-  <p:transition>
+  <p:transition xmlns:p14="http://schemas.microsoft.com/office/powerpoint/2010/main">
     <p:fade/>
   </p:transition>
   <p:timing>
     <p:tnLst>
       <p:par>
-        <p:cTn id="1" dur="indefinite" restart="never" nodeType="tmRoot"/>
+        <p:cTn xmlns:p14="http://schemas.microsoft.com/office/powerpoint/2010/main" id="1" dur="indefinite" restart="never" nodeType="tmRoot"/>
       </p:par>
     </p:tnLst>
   </p:timing>
@@ -29505,7 +29505,7 @@
           <a:p>
             <a:fld id="{1A65DBC3-C762-5448-9BBD-D642B95641C9}" type="datetime1">
               <a:rPr lang="gsw-FR" smtClean="0"/>
-              <a:t>09/09/2016</a:t>
+              <a:t>09.09.16</a:t>
             </a:fld>
             <a:endParaRPr lang="en-GB" dirty="0"/>
           </a:p>
@@ -29588,7 +29588,7 @@
             <a:fld id="{6C6AE60A-B69C-4790-82F7-3882EDF23186}" type="slidenum">
               <a:rPr lang="en-GB" smtClean="0"/>
               <a:pPr/>
-              <a:t>‹Nr.›</a:t>
+              <a:t>‹#›</a:t>
             </a:fld>
             <a:endParaRPr lang="en-GB" dirty="0"/>
           </a:p>
@@ -29896,13 +29896,13 @@
     <p:sldLayoutId id="2147483665" r:id="rId8"/>
     <p:sldLayoutId id="2147483668" r:id="rId9"/>
   </p:sldLayoutIdLst>
-  <p:transition>
+  <p:transition xmlns:p14="http://schemas.microsoft.com/office/powerpoint/2010/main">
     <p:fade/>
   </p:transition>
   <p:timing>
     <p:tnLst>
       <p:par>
-        <p:cTn id="1" dur="indefinite" restart="never" nodeType="tmRoot"/>
+        <p:cTn xmlns:p14="http://schemas.microsoft.com/office/powerpoint/2010/main" id="1" dur="indefinite" restart="never" nodeType="tmRoot"/>
       </p:par>
     </p:tnLst>
   </p:timing>
@@ -30192,7 +30192,7 @@
   </p:txStyles>
   <p:extLst mod="1">
     <p:ext uri="{27BBF7A9-308A-43DC-89C8-2F10F3537804}">
-      <p15:sldGuideLst xmlns:p15="http://schemas.microsoft.com/office/powerpoint/2012/main">
+      <p15:sldGuideLst xmlns:p15="http://schemas.microsoft.com/office/powerpoint/2012/main" xmlns="">
         <p15:guide id="1" pos="92" userDrawn="1">
           <p15:clr>
             <a:srgbClr val="F26B43"/>
@@ -30994,7 +30994,7 @@
           <a:p>
             <a:fld id="{6CA47D40-23D9-B143-92F2-6FA8511D9A1D}" type="datetime1">
               <a:rPr lang="gsw-FR" smtClean="0"/>
-              <a:t>09/09/2016</a:t>
+              <a:t>09.09.16</a:t>
             </a:fld>
             <a:endParaRPr lang="en-GB" dirty="0"/>
           </a:p>
@@ -31073,7 +31073,7 @@
             <a:fld id="{6C6AE60A-B69C-4790-82F7-3882EDF23186}" type="slidenum">
               <a:rPr lang="en-GB" smtClean="0"/>
               <a:pPr/>
-              <a:t>‹Nr.›</a:t>
+              <a:t>‹#›</a:t>
             </a:fld>
             <a:endParaRPr lang="en-GB" dirty="0"/>
           </a:p>
@@ -31396,13 +31396,13 @@
     <p:sldLayoutId id="2147483773" r:id="rId8"/>
     <p:sldLayoutId id="2147483776" r:id="rId9"/>
   </p:sldLayoutIdLst>
-  <p:transition>
+  <p:transition xmlns:p14="http://schemas.microsoft.com/office/powerpoint/2010/main">
     <p:fade/>
   </p:transition>
   <p:timing>
     <p:tnLst>
       <p:par>
-        <p:cTn id="1" dur="indefinite" restart="never" nodeType="tmRoot"/>
+        <p:cTn xmlns:p14="http://schemas.microsoft.com/office/powerpoint/2010/main" id="1" dur="indefinite" restart="never" nodeType="tmRoot"/>
       </p:par>
     </p:tnLst>
   </p:timing>
@@ -31692,7 +31692,7 @@
   </p:txStyles>
   <p:extLst mod="1">
     <p:ext uri="{27BBF7A9-308A-43DC-89C8-2F10F3537804}">
-      <p15:sldGuideLst xmlns:p15="http://schemas.microsoft.com/office/powerpoint/2012/main">
+      <p15:sldGuideLst xmlns:p15="http://schemas.microsoft.com/office/powerpoint/2012/main" xmlns="">
         <p15:guide id="1" pos="92" userDrawn="1">
           <p15:clr>
             <a:srgbClr val="F26B43"/>
@@ -32494,7 +32494,7 @@
           <a:p>
             <a:fld id="{3D886581-0C77-FE40-867D-8197BA3643B6}" type="datetime1">
               <a:rPr lang="gsw-FR" smtClean="0"/>
-              <a:t>09/09/2016</a:t>
+              <a:t>09.09.16</a:t>
             </a:fld>
             <a:endParaRPr lang="en-GB" dirty="0"/>
           </a:p>
@@ -32573,7 +32573,7 @@
             <a:fld id="{6C6AE60A-B69C-4790-82F7-3882EDF23186}" type="slidenum">
               <a:rPr lang="en-GB" smtClean="0"/>
               <a:pPr/>
-              <a:t>‹Nr.›</a:t>
+              <a:t>‹#›</a:t>
             </a:fld>
             <a:endParaRPr lang="en-GB" dirty="0"/>
           </a:p>
@@ -32896,13 +32896,13 @@
     <p:sldLayoutId id="2147483785" r:id="rId8"/>
     <p:sldLayoutId id="2147483788" r:id="rId9"/>
   </p:sldLayoutIdLst>
-  <p:transition>
+  <p:transition xmlns:p14="http://schemas.microsoft.com/office/powerpoint/2010/main">
     <p:fade/>
   </p:transition>
   <p:timing>
     <p:tnLst>
       <p:par>
-        <p:cTn id="1" dur="indefinite" restart="never" nodeType="tmRoot"/>
+        <p:cTn xmlns:p14="http://schemas.microsoft.com/office/powerpoint/2010/main" id="1" dur="indefinite" restart="never" nodeType="tmRoot"/>
       </p:par>
     </p:tnLst>
   </p:timing>
@@ -33192,7 +33192,7 @@
   </p:txStyles>
   <p:extLst mod="1">
     <p:ext uri="{27BBF7A9-308A-43DC-89C8-2F10F3537804}">
-      <p15:sldGuideLst xmlns:p15="http://schemas.microsoft.com/office/powerpoint/2012/main">
+      <p15:sldGuideLst xmlns:p15="http://schemas.microsoft.com/office/powerpoint/2012/main" xmlns="">
         <p15:guide id="1" pos="92" userDrawn="1">
           <p15:clr>
             <a:srgbClr val="F26B43"/>
@@ -33994,7 +33994,7 @@
           <a:p>
             <a:fld id="{08EF2A14-03D0-8E4D-B010-518BB080B660}" type="datetime1">
               <a:rPr lang="gsw-FR" smtClean="0"/>
-              <a:t>09/09/2016</a:t>
+              <a:t>09.09.16</a:t>
             </a:fld>
             <a:endParaRPr lang="en-GB" dirty="0"/>
           </a:p>
@@ -34073,7 +34073,7 @@
             <a:fld id="{6C6AE60A-B69C-4790-82F7-3882EDF23186}" type="slidenum">
               <a:rPr lang="en-GB" smtClean="0"/>
               <a:pPr/>
-              <a:t>‹Nr.›</a:t>
+              <a:t>‹#›</a:t>
             </a:fld>
             <a:endParaRPr lang="en-GB" dirty="0"/>
           </a:p>
@@ -34396,13 +34396,13 @@
     <p:sldLayoutId id="2147483797" r:id="rId8"/>
     <p:sldLayoutId id="2147483800" r:id="rId9"/>
   </p:sldLayoutIdLst>
-  <p:transition>
+  <p:transition xmlns:p14="http://schemas.microsoft.com/office/powerpoint/2010/main">
     <p:fade/>
   </p:transition>
   <p:timing>
     <p:tnLst>
       <p:par>
-        <p:cTn id="1" dur="indefinite" restart="never" nodeType="tmRoot"/>
+        <p:cTn xmlns:p14="http://schemas.microsoft.com/office/powerpoint/2010/main" id="1" dur="indefinite" restart="never" nodeType="tmRoot"/>
       </p:par>
     </p:tnLst>
   </p:timing>
@@ -34692,7 +34692,7 @@
   </p:txStyles>
   <p:extLst mod="1">
     <p:ext uri="{27BBF7A9-308A-43DC-89C8-2F10F3537804}">
-      <p15:sldGuideLst xmlns:p15="http://schemas.microsoft.com/office/powerpoint/2012/main">
+      <p15:sldGuideLst xmlns:p15="http://schemas.microsoft.com/office/powerpoint/2012/main" xmlns="">
         <p15:guide id="1" pos="92" userDrawn="1">
           <p15:clr>
             <a:srgbClr val="F26B43"/>
@@ -35494,7 +35494,7 @@
           <a:p>
             <a:fld id="{F6D25BFD-EF5A-0044-AB6F-18F9434CE934}" type="datetime1">
               <a:rPr lang="gsw-FR" smtClean="0"/>
-              <a:t>09/09/2016</a:t>
+              <a:t>09.09.16</a:t>
             </a:fld>
             <a:endParaRPr lang="en-GB" dirty="0"/>
           </a:p>
@@ -35573,7 +35573,7 @@
             <a:fld id="{6C6AE60A-B69C-4790-82F7-3882EDF23186}" type="slidenum">
               <a:rPr lang="en-GB" smtClean="0"/>
               <a:pPr/>
-              <a:t>‹Nr.›</a:t>
+              <a:t>‹#›</a:t>
             </a:fld>
             <a:endParaRPr lang="en-GB" dirty="0"/>
           </a:p>
@@ -35896,13 +35896,13 @@
     <p:sldLayoutId id="2147483809" r:id="rId8"/>
     <p:sldLayoutId id="2147483812" r:id="rId9"/>
   </p:sldLayoutIdLst>
-  <p:transition>
+  <p:transition xmlns:p14="http://schemas.microsoft.com/office/powerpoint/2010/main">
     <p:fade/>
   </p:transition>
   <p:timing>
     <p:tnLst>
       <p:par>
-        <p:cTn id="1" dur="indefinite" restart="never" nodeType="tmRoot"/>
+        <p:cTn xmlns:p14="http://schemas.microsoft.com/office/powerpoint/2010/main" id="1" dur="indefinite" restart="never" nodeType="tmRoot"/>
       </p:par>
     </p:tnLst>
   </p:timing>
@@ -36192,7 +36192,7 @@
   </p:txStyles>
   <p:extLst mod="1">
     <p:ext uri="{27BBF7A9-308A-43DC-89C8-2F10F3537804}">
-      <p15:sldGuideLst xmlns:p15="http://schemas.microsoft.com/office/powerpoint/2012/main">
+      <p15:sldGuideLst xmlns:p15="http://schemas.microsoft.com/office/powerpoint/2012/main" xmlns="">
         <p15:guide id="1" pos="92" userDrawn="1">
           <p15:clr>
             <a:srgbClr val="F26B43"/>
@@ -36994,7 +36994,7 @@
           <a:p>
             <a:fld id="{E543C03B-B407-0145-9D92-04B37AF8B514}" type="datetime1">
               <a:rPr lang="gsw-FR" smtClean="0"/>
-              <a:t>09/09/2016</a:t>
+              <a:t>09.09.16</a:t>
             </a:fld>
             <a:endParaRPr lang="en-GB" dirty="0"/>
           </a:p>
@@ -37073,7 +37073,7 @@
             <a:fld id="{6C6AE60A-B69C-4790-82F7-3882EDF23186}" type="slidenum">
               <a:rPr lang="en-GB" smtClean="0"/>
               <a:pPr/>
-              <a:t>‹Nr.›</a:t>
+              <a:t>‹#›</a:t>
             </a:fld>
             <a:endParaRPr lang="en-GB" dirty="0"/>
           </a:p>
@@ -37396,13 +37396,13 @@
     <p:sldLayoutId id="2147483821" r:id="rId8"/>
     <p:sldLayoutId id="2147483824" r:id="rId9"/>
   </p:sldLayoutIdLst>
-  <p:transition>
+  <p:transition xmlns:p14="http://schemas.microsoft.com/office/powerpoint/2010/main">
     <p:fade/>
   </p:transition>
   <p:timing>
     <p:tnLst>
       <p:par>
-        <p:cTn id="1" dur="indefinite" restart="never" nodeType="tmRoot"/>
+        <p:cTn xmlns:p14="http://schemas.microsoft.com/office/powerpoint/2010/main" id="1" dur="indefinite" restart="never" nodeType="tmRoot"/>
       </p:par>
     </p:tnLst>
   </p:timing>
@@ -37692,7 +37692,7 @@
   </p:txStyles>
   <p:extLst mod="1">
     <p:ext uri="{27BBF7A9-308A-43DC-89C8-2F10F3537804}">
-      <p15:sldGuideLst xmlns:p15="http://schemas.microsoft.com/office/powerpoint/2012/main">
+      <p15:sldGuideLst xmlns:p15="http://schemas.microsoft.com/office/powerpoint/2012/main" xmlns="">
         <p15:guide id="1" pos="92" userDrawn="1">
           <p15:clr>
             <a:srgbClr val="F26B43"/>
@@ -38494,7 +38494,7 @@
           <a:p>
             <a:fld id="{45CAE7A0-F5C4-CA48-BCB9-EED642E8DB18}" type="datetime1">
               <a:rPr lang="gsw-FR" smtClean="0"/>
-              <a:t>09/09/2016</a:t>
+              <a:t>09.09.16</a:t>
             </a:fld>
             <a:endParaRPr lang="en-GB" dirty="0"/>
           </a:p>
@@ -38573,7 +38573,7 @@
             <a:fld id="{6C6AE60A-B69C-4790-82F7-3882EDF23186}" type="slidenum">
               <a:rPr lang="en-GB" smtClean="0"/>
               <a:pPr/>
-              <a:t>‹Nr.›</a:t>
+              <a:t>‹#›</a:t>
             </a:fld>
             <a:endParaRPr lang="en-GB" dirty="0"/>
           </a:p>
@@ -38896,13 +38896,13 @@
     <p:sldLayoutId id="2147483833" r:id="rId8"/>
     <p:sldLayoutId id="2147483836" r:id="rId9"/>
   </p:sldLayoutIdLst>
-  <p:transition>
+  <p:transition xmlns:p14="http://schemas.microsoft.com/office/powerpoint/2010/main">
     <p:fade/>
   </p:transition>
   <p:timing>
     <p:tnLst>
       <p:par>
-        <p:cTn id="1" dur="indefinite" restart="never" nodeType="tmRoot"/>
+        <p:cTn xmlns:p14="http://schemas.microsoft.com/office/powerpoint/2010/main" id="1" dur="indefinite" restart="never" nodeType="tmRoot"/>
       </p:par>
     </p:tnLst>
   </p:timing>
@@ -39192,7 +39192,7 @@
   </p:txStyles>
   <p:extLst mod="1">
     <p:ext uri="{27BBF7A9-308A-43DC-89C8-2F10F3537804}">
-      <p15:sldGuideLst xmlns:p15="http://schemas.microsoft.com/office/powerpoint/2012/main">
+      <p15:sldGuideLst xmlns:p15="http://schemas.microsoft.com/office/powerpoint/2012/main" xmlns="">
         <p15:guide id="1" pos="92" userDrawn="1">
           <p15:clr>
             <a:srgbClr val="F26B43"/>
@@ -39994,7 +39994,7 @@
           <a:p>
             <a:fld id="{56571357-6738-6146-B6CE-0CE653271183}" type="datetime1">
               <a:rPr lang="gsw-FR" smtClean="0"/>
-              <a:t>09/09/2016</a:t>
+              <a:t>09.09.16</a:t>
             </a:fld>
             <a:endParaRPr lang="en-GB" dirty="0"/>
           </a:p>
@@ -40073,7 +40073,7 @@
             <a:fld id="{6C6AE60A-B69C-4790-82F7-3882EDF23186}" type="slidenum">
               <a:rPr lang="en-GB" smtClean="0"/>
               <a:pPr/>
-              <a:t>‹Nr.›</a:t>
+              <a:t>‹#›</a:t>
             </a:fld>
             <a:endParaRPr lang="en-GB" dirty="0"/>
           </a:p>
@@ -40396,13 +40396,13 @@
     <p:sldLayoutId id="2147483845" r:id="rId8"/>
     <p:sldLayoutId id="2147483848" r:id="rId9"/>
   </p:sldLayoutIdLst>
-  <p:transition>
+  <p:transition xmlns:p14="http://schemas.microsoft.com/office/powerpoint/2010/main">
     <p:fade/>
   </p:transition>
   <p:timing>
     <p:tnLst>
       <p:par>
-        <p:cTn id="1" dur="indefinite" restart="never" nodeType="tmRoot"/>
+        <p:cTn xmlns:p14="http://schemas.microsoft.com/office/powerpoint/2010/main" id="1" dur="indefinite" restart="never" nodeType="tmRoot"/>
       </p:par>
     </p:tnLst>
   </p:timing>
@@ -40692,7 +40692,7 @@
   </p:txStyles>
   <p:extLst mod="1">
     <p:ext uri="{27BBF7A9-308A-43DC-89C8-2F10F3537804}">
-      <p15:sldGuideLst xmlns:p15="http://schemas.microsoft.com/office/powerpoint/2012/main">
+      <p15:sldGuideLst xmlns:p15="http://schemas.microsoft.com/office/powerpoint/2012/main" xmlns="">
         <p15:guide id="1" pos="92" userDrawn="1">
           <p15:clr>
             <a:srgbClr val="F26B43"/>
@@ -41494,7 +41494,7 @@
           <a:p>
             <a:fld id="{1F370C02-2BF6-1D48-BA02-D4D6A5055020}" type="datetime1">
               <a:rPr lang="gsw-FR" smtClean="0"/>
-              <a:t>09/09/2016</a:t>
+              <a:t>09.09.16</a:t>
             </a:fld>
             <a:endParaRPr lang="en-GB" dirty="0"/>
           </a:p>
@@ -41573,7 +41573,7 @@
             <a:fld id="{6C6AE60A-B69C-4790-82F7-3882EDF23186}" type="slidenum">
               <a:rPr lang="en-GB" smtClean="0"/>
               <a:pPr/>
-              <a:t>‹Nr.›</a:t>
+              <a:t>‹#›</a:t>
             </a:fld>
             <a:endParaRPr lang="en-GB" dirty="0"/>
           </a:p>
@@ -41896,13 +41896,13 @@
     <p:sldLayoutId id="2147483857" r:id="rId8"/>
     <p:sldLayoutId id="2147483860" r:id="rId9"/>
   </p:sldLayoutIdLst>
-  <p:transition>
+  <p:transition xmlns:p14="http://schemas.microsoft.com/office/powerpoint/2010/main">
     <p:fade/>
   </p:transition>
   <p:timing>
     <p:tnLst>
       <p:par>
-        <p:cTn id="1" dur="indefinite" restart="never" nodeType="tmRoot"/>
+        <p:cTn xmlns:p14="http://schemas.microsoft.com/office/powerpoint/2010/main" id="1" dur="indefinite" restart="never" nodeType="tmRoot"/>
       </p:par>
     </p:tnLst>
   </p:timing>
@@ -42192,7 +42192,7 @@
   </p:txStyles>
   <p:extLst mod="1">
     <p:ext uri="{27BBF7A9-308A-43DC-89C8-2F10F3537804}">
-      <p15:sldGuideLst xmlns:p15="http://schemas.microsoft.com/office/powerpoint/2012/main">
+      <p15:sldGuideLst xmlns:p15="http://schemas.microsoft.com/office/powerpoint/2012/main" xmlns="">
         <p15:guide id="1" pos="92" userDrawn="1">
           <p15:clr>
             <a:srgbClr val="F26B43"/>
@@ -42349,7 +42349,7 @@
           <a:p>
             <a:fld id="{5E0E7C9C-3F33-EF49-8D31-D166A5CD69B6}" type="datetime1">
               <a:rPr lang="gsw-FR" smtClean="0"/>
-              <a:t>09/09/2016</a:t>
+              <a:t>09.09.16</a:t>
             </a:fld>
             <a:endParaRPr lang="en-GB" dirty="0"/>
           </a:p>
@@ -42460,13 +42460,13 @@
   <p:clrMapOvr>
     <a:masterClrMapping/>
   </p:clrMapOvr>
-  <p:transition>
+  <p:transition xmlns:p14="http://schemas.microsoft.com/office/powerpoint/2010/main">
     <p:fade/>
   </p:transition>
   <p:timing>
     <p:tnLst>
       <p:par>
-        <p:cTn id="1" dur="indefinite" restart="never" nodeType="tmRoot"/>
+        <p:cTn xmlns:p14="http://schemas.microsoft.com/office/powerpoint/2010/main" id="1" dur="indefinite" restart="never" nodeType="tmRoot"/>
       </p:par>
     </p:tnLst>
   </p:timing>
@@ -42581,7 +42581,7 @@
           <a:p>
             <a:fld id="{6653CBBA-7972-0445-94FD-93C194816572}" type="datetime1">
               <a:rPr lang="gsw-FR" smtClean="0"/>
-              <a:t>09/09/2016</a:t>
+              <a:t>09.09.16</a:t>
             </a:fld>
             <a:endParaRPr lang="en-GB" dirty="0"/>
           </a:p>
@@ -42666,13 +42666,13 @@
   <p:clrMapOvr>
     <a:masterClrMapping/>
   </p:clrMapOvr>
-  <p:transition>
+  <p:transition xmlns:p14="http://schemas.microsoft.com/office/powerpoint/2010/main">
     <p:fade/>
   </p:transition>
   <p:timing>
     <p:tnLst>
       <p:par>
-        <p:cTn id="1" dur="indefinite" restart="never" nodeType="tmRoot"/>
+        <p:cTn xmlns:p14="http://schemas.microsoft.com/office/powerpoint/2010/main" id="1" dur="indefinite" restart="never" nodeType="tmRoot"/>
       </p:par>
     </p:tnLst>
   </p:timing>
@@ -42713,7 +42713,7 @@
           <a:p>
             <a:fld id="{6653CBBA-7972-0445-94FD-93C194816572}" type="datetime1">
               <a:rPr lang="gsw-FR" smtClean="0"/>
-              <a:t>09/09/2016</a:t>
+              <a:t>09.09.16</a:t>
             </a:fld>
             <a:endParaRPr lang="en-GB" dirty="0"/>
           </a:p>
@@ -43582,13 +43582,13 @@
   <p:clrMapOvr>
     <a:masterClrMapping/>
   </p:clrMapOvr>
-  <p:transition>
+  <p:transition xmlns:p14="http://schemas.microsoft.com/office/powerpoint/2010/main">
     <p:fade/>
   </p:transition>
   <p:timing>
     <p:tnLst>
       <p:par>
-        <p:cTn id="1" dur="indefinite" restart="never" nodeType="tmRoot">
+        <p:cTn xmlns:p14="http://schemas.microsoft.com/office/powerpoint/2010/main" id="1" dur="indefinite" restart="never" nodeType="tmRoot">
           <p:childTnLst>
             <p:seq concurrent="1" nextAc="seek">
               <p:cTn id="2" dur="indefinite" nodeType="mainSeq">
@@ -44037,7 +44037,7 @@
           <a:p>
             <a:fld id="{6653CBBA-7972-0445-94FD-93C194816572}" type="datetime1">
               <a:rPr lang="gsw-FR" smtClean="0"/>
-              <a:t>09/09/2016</a:t>
+              <a:t>09.09.16</a:t>
             </a:fld>
             <a:endParaRPr lang="en-GB" dirty="0"/>
           </a:p>
@@ -44152,13 +44152,13 @@
   <p:clrMapOvr>
     <a:masterClrMapping/>
   </p:clrMapOvr>
-  <p:transition>
+  <p:transition xmlns:p14="http://schemas.microsoft.com/office/powerpoint/2010/main">
     <p:fade/>
   </p:transition>
   <p:timing>
     <p:tnLst>
       <p:par>
-        <p:cTn id="1" dur="indefinite" restart="never" nodeType="tmRoot"/>
+        <p:cTn xmlns:p14="http://schemas.microsoft.com/office/powerpoint/2010/main" id="1" dur="indefinite" restart="never" nodeType="tmRoot"/>
       </p:par>
     </p:tnLst>
   </p:timing>
@@ -44346,7 +44346,7 @@
           <a:p>
             <a:fld id="{6653CBBA-7972-0445-94FD-93C194816572}" type="datetime1">
               <a:rPr lang="gsw-FR" smtClean="0"/>
-              <a:t>09/09/2016</a:t>
+              <a:t>09.09.16</a:t>
             </a:fld>
             <a:endParaRPr lang="en-GB" dirty="0"/>
           </a:p>
@@ -44431,13 +44431,13 @@
   <p:clrMapOvr>
     <a:masterClrMapping/>
   </p:clrMapOvr>
-  <p:transition>
+  <p:transition xmlns:p14="http://schemas.microsoft.com/office/powerpoint/2010/main">
     <p:fade/>
   </p:transition>
   <p:timing>
     <p:tnLst>
       <p:par>
-        <p:cTn id="1" dur="indefinite" restart="never" nodeType="tmRoot"/>
+        <p:cTn xmlns:p14="http://schemas.microsoft.com/office/powerpoint/2010/main" id="1" dur="indefinite" restart="never" nodeType="tmRoot"/>
       </p:par>
     </p:tnLst>
   </p:timing>
@@ -44463,25 +44463,6 @@
       </p:grpSpPr>
       <p:sp>
         <p:nvSpPr>
-          <p:cNvPr id="2" name="Content Placeholder 1"/>
-          <p:cNvSpPr>
-            <a:spLocks noGrp="1"/>
-          </p:cNvSpPr>
-          <p:nvPr>
-            <p:ph idx="1"/>
-          </p:nvPr>
-        </p:nvSpPr>
-        <p:spPr/>
-        <p:txBody>
-          <a:bodyPr/>
-          <a:lstStyle/>
-          <a:p>
-            <a:endParaRPr lang="en-US"/>
-          </a:p>
-        </p:txBody>
-      </p:sp>
-      <p:sp>
-        <p:nvSpPr>
           <p:cNvPr id="3" name="Date Placeholder 2"/>
           <p:cNvSpPr>
             <a:spLocks noGrp="1"/>
@@ -44497,7 +44478,7 @@
           <a:p>
             <a:fld id="{6653CBBA-7972-0445-94FD-93C194816572}" type="datetime1">
               <a:rPr lang="gsw-FR" smtClean="0"/>
-              <a:t>09/09/2016</a:t>
+              <a:t>09.09.16</a:t>
             </a:fld>
             <a:endParaRPr lang="en-GB" dirty="0"/>
           </a:p>
@@ -44572,6 +44553,66 @@
           </a:p>
         </p:txBody>
       </p:sp>
+      <p:pic>
+        <p:nvPicPr>
+          <p:cNvPr id="7" name="Picture 6" descr="Pasted image at 2016_09_09 10_58 AM.png"/>
+          <p:cNvPicPr>
+            <a:picLocks noChangeAspect="1"/>
+          </p:cNvPicPr>
+          <p:nvPr/>
+        </p:nvPicPr>
+        <p:blipFill>
+          <a:blip r:embed="rId2">
+            <a:extLst>
+              <a:ext uri="{28A0092B-C50C-407E-A947-70E740481C1C}">
+                <a14:useLocalDpi xmlns:a14="http://schemas.microsoft.com/office/drawing/2010/main" val="0"/>
+              </a:ext>
+            </a:extLst>
+          </a:blip>
+          <a:stretch>
+            <a:fillRect/>
+          </a:stretch>
+        </p:blipFill>
+        <p:spPr>
+          <a:xfrm>
+            <a:off x="323850" y="1592714"/>
+            <a:ext cx="6992289" cy="2496789"/>
+          </a:xfrm>
+          <a:prstGeom prst="rect">
+            <a:avLst/>
+          </a:prstGeom>
+        </p:spPr>
+      </p:pic>
+      <p:pic>
+        <p:nvPicPr>
+          <p:cNvPr id="9" name="Picture 8" descr="Pasted image at 2016_09_09 11_00 AM.png"/>
+          <p:cNvPicPr>
+            <a:picLocks noChangeAspect="1"/>
+          </p:cNvPicPr>
+          <p:nvPr/>
+        </p:nvPicPr>
+        <p:blipFill>
+          <a:blip r:embed="rId3">
+            <a:extLst>
+              <a:ext uri="{28A0092B-C50C-407E-A947-70E740481C1C}">
+                <a14:useLocalDpi xmlns:a14="http://schemas.microsoft.com/office/drawing/2010/main" val="0"/>
+              </a:ext>
+            </a:extLst>
+          </a:blip>
+          <a:stretch>
+            <a:fillRect/>
+          </a:stretch>
+        </p:blipFill>
+        <p:spPr>
+          <a:xfrm>
+            <a:off x="4085994" y="4076435"/>
+            <a:ext cx="7775805" cy="2232290"/>
+          </a:xfrm>
+          <a:prstGeom prst="rect">
+            <a:avLst/>
+          </a:prstGeom>
+        </p:spPr>
+      </p:pic>
     </p:spTree>
     <p:extLst>
       <p:ext uri="{BB962C8B-B14F-4D97-AF65-F5344CB8AC3E}">
@@ -44582,13 +44623,13 @@
   <p:clrMapOvr>
     <a:masterClrMapping/>
   </p:clrMapOvr>
-  <p:transition>
+  <p:transition xmlns:p14="http://schemas.microsoft.com/office/powerpoint/2010/main">
     <p:fade/>
   </p:transition>
   <p:timing>
     <p:tnLst>
       <p:par>
-        <p:cTn id="1" dur="indefinite" restart="never" nodeType="tmRoot"/>
+        <p:cTn xmlns:p14="http://schemas.microsoft.com/office/powerpoint/2010/main" id="1" dur="indefinite" restart="never" nodeType="tmRoot"/>
       </p:par>
     </p:tnLst>
   </p:timing>
@@ -44713,7 +44754,7 @@
           <a:p>
             <a:fld id="{6653CBBA-7972-0445-94FD-93C194816572}" type="datetime1">
               <a:rPr lang="gsw-FR" smtClean="0"/>
-              <a:t>09/09/2016</a:t>
+              <a:t>09.09.16</a:t>
             </a:fld>
             <a:endParaRPr lang="en-GB" dirty="0"/>
           </a:p>
@@ -44798,13 +44839,13 @@
   <p:clrMapOvr>
     <a:masterClrMapping/>
   </p:clrMapOvr>
-  <p:transition>
+  <p:transition xmlns:p14="http://schemas.microsoft.com/office/powerpoint/2010/main">
     <p:fade/>
   </p:transition>
   <p:timing>
     <p:tnLst>
       <p:par>
-        <p:cTn id="1" dur="indefinite" restart="never" nodeType="tmRoot"/>
+        <p:cTn xmlns:p14="http://schemas.microsoft.com/office/powerpoint/2010/main" id="1" dur="indefinite" restart="never" nodeType="tmRoot"/>
       </p:par>
     </p:tnLst>
   </p:timing>
@@ -44845,7 +44886,7 @@
           <a:p>
             <a:fld id="{6653CBBA-7972-0445-94FD-93C194816572}" type="datetime1">
               <a:rPr lang="gsw-FR" smtClean="0"/>
-              <a:t>09/09/2016</a:t>
+              <a:t>09.09.16</a:t>
             </a:fld>
             <a:endParaRPr lang="en-GB" dirty="0"/>
           </a:p>
@@ -45703,6 +45744,68 @@
           </a:p>
         </p:txBody>
       </p:sp>
+      <p:sp>
+        <p:nvSpPr>
+          <p:cNvPr id="22" name="TextBox 21"/>
+          <p:cNvSpPr txBox="1"/>
+          <p:nvPr/>
+        </p:nvSpPr>
+        <p:spPr>
+          <a:xfrm>
+            <a:off x="3170452" y="3827999"/>
+            <a:ext cx="1142861" cy="461665"/>
+          </a:xfrm>
+          <a:prstGeom prst="rect">
+            <a:avLst/>
+          </a:prstGeom>
+          <a:noFill/>
+        </p:spPr>
+        <p:txBody>
+          <a:bodyPr wrap="none" rtlCol="0">
+            <a:spAutoFit/>
+          </a:bodyPr>
+          <a:lstStyle/>
+          <a:p>
+            <a:pPr algn="ctr"/>
+            <a:r>
+              <a:rPr lang="en-US" sz="2400" dirty="0" smtClean="0"/>
+              <a:t>Set bid</a:t>
+            </a:r>
+            <a:endParaRPr lang="en-US" sz="2400" dirty="0"/>
+          </a:p>
+        </p:txBody>
+      </p:sp>
+      <p:sp>
+        <p:nvSpPr>
+          <p:cNvPr id="23" name="TextBox 22"/>
+          <p:cNvSpPr txBox="1"/>
+          <p:nvPr/>
+        </p:nvSpPr>
+        <p:spPr>
+          <a:xfrm>
+            <a:off x="7872337" y="3827999"/>
+            <a:ext cx="1142861" cy="461665"/>
+          </a:xfrm>
+          <a:prstGeom prst="rect">
+            <a:avLst/>
+          </a:prstGeom>
+          <a:noFill/>
+        </p:spPr>
+        <p:txBody>
+          <a:bodyPr wrap="none" rtlCol="0">
+            <a:spAutoFit/>
+          </a:bodyPr>
+          <a:lstStyle/>
+          <a:p>
+            <a:pPr algn="ctr"/>
+            <a:r>
+              <a:rPr lang="en-US" sz="2400" dirty="0" smtClean="0"/>
+              <a:t>Set bid</a:t>
+            </a:r>
+            <a:endParaRPr lang="en-US" sz="2400" dirty="0"/>
+          </a:p>
+        </p:txBody>
+      </p:sp>
     </p:spTree>
     <p:extLst>
       <p:ext uri="{BB962C8B-B14F-4D97-AF65-F5344CB8AC3E}">
@@ -45713,13 +45816,13 @@
   <p:clrMapOvr>
     <a:masterClrMapping/>
   </p:clrMapOvr>
-  <p:transition>
+  <p:transition xmlns:p14="http://schemas.microsoft.com/office/powerpoint/2010/main">
     <p:fade/>
   </p:transition>
   <p:timing>
     <p:tnLst>
       <p:par>
-        <p:cTn id="1" dur="indefinite" restart="never" nodeType="tmRoot"/>
+        <p:cTn xmlns:p14="http://schemas.microsoft.com/office/powerpoint/2010/main" id="1" dur="indefinite" restart="never" nodeType="tmRoot"/>
       </p:par>
     </p:tnLst>
   </p:timing>
@@ -45760,7 +45863,7 @@
           <a:p>
             <a:fld id="{6653CBBA-7972-0445-94FD-93C194816572}" type="datetime1">
               <a:rPr lang="gsw-FR" smtClean="0"/>
-              <a:t>09/09/2016</a:t>
+              <a:t>09.09.16</a:t>
             </a:fld>
             <a:endParaRPr lang="en-GB" dirty="0"/>
           </a:p>
@@ -46635,13 +46738,13 @@
   <p:clrMapOvr>
     <a:masterClrMapping/>
   </p:clrMapOvr>
-  <p:transition>
+  <p:transition xmlns:p14="http://schemas.microsoft.com/office/powerpoint/2010/main">
     <p:fade/>
   </p:transition>
   <p:timing>
     <p:tnLst>
       <p:par>
-        <p:cTn id="1" dur="indefinite" restart="never" nodeType="tmRoot"/>
+        <p:cTn xmlns:p14="http://schemas.microsoft.com/office/powerpoint/2010/main" id="1" dur="indefinite" restart="never" nodeType="tmRoot"/>
       </p:par>
     </p:tnLst>
   </p:timing>
@@ -47058,7 +47161,7 @@
   </a:custClrLst>
   <a:extLst>
     <a:ext uri="{05A4C25C-085E-4340-85A3-A5531E510DB2}">
-      <thm15:themeFamily xmlns:thm15="http://schemas.microsoft.com/office/thememl/2012/main" name="eth_praesentation_16zu9_ETH1_d" id="{F9B539DF-8A69-4439-8089-24A40A980317}" vid="{5D9C827C-5BA7-402A-8ABB-C7F0BA4B4DEC}"/>
+      <thm15:themeFamily xmlns:thm15="http://schemas.microsoft.com/office/thememl/2012/main" xmlns="" name="eth_praesentation_16zu9_ETH1_d" id="{F9B539DF-8A69-4439-8089-24A40A980317}" vid="{5D9C827C-5BA7-402A-8ABB-C7F0BA4B4DEC}"/>
     </a:ext>
   </a:extLst>
 </a:theme>
@@ -48079,7 +48182,7 @@
   </a:custClrLst>
   <a:extLst>
     <a:ext uri="{05A4C25C-085E-4340-85A3-A5531E510DB2}">
-      <thm15:themeFamily xmlns:thm15="http://schemas.microsoft.com/office/thememl/2012/main" name="eth_praesentation_16zu9_ETH1_d" id="{F9B539DF-8A69-4439-8089-24A40A980317}" vid="{5D9C827C-5BA7-402A-8ABB-C7F0BA4B4DEC}"/>
+      <thm15:themeFamily xmlns:thm15="http://schemas.microsoft.com/office/thememl/2012/main" xmlns="" name="eth_praesentation_16zu9_ETH1_d" id="{F9B539DF-8A69-4439-8089-24A40A980317}" vid="{5D9C827C-5BA7-402A-8ABB-C7F0BA4B4DEC}"/>
     </a:ext>
   </a:extLst>
 </a:theme>
@@ -48495,7 +48598,7 @@
   </a:custClrLst>
   <a:extLst>
     <a:ext uri="{05A4C25C-085E-4340-85A3-A5531E510DB2}">
-      <thm15:themeFamily xmlns:thm15="http://schemas.microsoft.com/office/thememl/2012/main" name="eth_praesentation_16zu9_ETH1_d" id="{F9B539DF-8A69-4439-8089-24A40A980317}" vid="{5D9C827C-5BA7-402A-8ABB-C7F0BA4B4DEC}"/>
+      <thm15:themeFamily xmlns:thm15="http://schemas.microsoft.com/office/thememl/2012/main" xmlns="" name="eth_praesentation_16zu9_ETH1_d" id="{F9B539DF-8A69-4439-8089-24A40A980317}" vid="{5D9C827C-5BA7-402A-8ABB-C7F0BA4B4DEC}"/>
     </a:ext>
   </a:extLst>
 </a:theme>
@@ -48911,7 +49014,7 @@
   </a:custClrLst>
   <a:extLst>
     <a:ext uri="{05A4C25C-085E-4340-85A3-A5531E510DB2}">
-      <thm15:themeFamily xmlns:thm15="http://schemas.microsoft.com/office/thememl/2012/main" name="eth_praesentation_16zu9_ETH1_d" id="{F9B539DF-8A69-4439-8089-24A40A980317}" vid="{5D9C827C-5BA7-402A-8ABB-C7F0BA4B4DEC}"/>
+      <thm15:themeFamily xmlns:thm15="http://schemas.microsoft.com/office/thememl/2012/main" xmlns="" name="eth_praesentation_16zu9_ETH1_d" id="{F9B539DF-8A69-4439-8089-24A40A980317}" vid="{5D9C827C-5BA7-402A-8ABB-C7F0BA4B4DEC}"/>
     </a:ext>
   </a:extLst>
 </a:theme>
@@ -49327,7 +49430,7 @@
   </a:custClrLst>
   <a:extLst>
     <a:ext uri="{05A4C25C-085E-4340-85A3-A5531E510DB2}">
-      <thm15:themeFamily xmlns:thm15="http://schemas.microsoft.com/office/thememl/2012/main" name="eth_praesentation_16zu9_ETH1_d" id="{F9B539DF-8A69-4439-8089-24A40A980317}" vid="{5D9C827C-5BA7-402A-8ABB-C7F0BA4B4DEC}"/>
+      <thm15:themeFamily xmlns:thm15="http://schemas.microsoft.com/office/thememl/2012/main" xmlns="" name="eth_praesentation_16zu9_ETH1_d" id="{F9B539DF-8A69-4439-8089-24A40A980317}" vid="{5D9C827C-5BA7-402A-8ABB-C7F0BA4B4DEC}"/>
     </a:ext>
   </a:extLst>
 </a:theme>
@@ -49743,7 +49846,7 @@
   </a:custClrLst>
   <a:extLst>
     <a:ext uri="{05A4C25C-085E-4340-85A3-A5531E510DB2}">
-      <thm15:themeFamily xmlns:thm15="http://schemas.microsoft.com/office/thememl/2012/main" name="eth_praesentation_16zu9_ETH1_d" id="{F9B539DF-8A69-4439-8089-24A40A980317}" vid="{5D9C827C-5BA7-402A-8ABB-C7F0BA4B4DEC}"/>
+      <thm15:themeFamily xmlns:thm15="http://schemas.microsoft.com/office/thememl/2012/main" xmlns="" name="eth_praesentation_16zu9_ETH1_d" id="{F9B539DF-8A69-4439-8089-24A40A980317}" vid="{5D9C827C-5BA7-402A-8ABB-C7F0BA4B4DEC}"/>
     </a:ext>
   </a:extLst>
 </a:theme>
@@ -50159,7 +50262,7 @@
   </a:custClrLst>
   <a:extLst>
     <a:ext uri="{05A4C25C-085E-4340-85A3-A5531E510DB2}">
-      <thm15:themeFamily xmlns:thm15="http://schemas.microsoft.com/office/thememl/2012/main" name="eth_praesentation_16zu9_ETH1_d" id="{F9B539DF-8A69-4439-8089-24A40A980317}" vid="{5D9C827C-5BA7-402A-8ABB-C7F0BA4B4DEC}"/>
+      <thm15:themeFamily xmlns:thm15="http://schemas.microsoft.com/office/thememl/2012/main" xmlns="" name="eth_praesentation_16zu9_ETH1_d" id="{F9B539DF-8A69-4439-8089-24A40A980317}" vid="{5D9C827C-5BA7-402A-8ABB-C7F0BA4B4DEC}"/>
     </a:ext>
   </a:extLst>
 </a:theme>
@@ -50575,7 +50678,7 @@
   </a:custClrLst>
   <a:extLst>
     <a:ext uri="{05A4C25C-085E-4340-85A3-A5531E510DB2}">
-      <thm15:themeFamily xmlns:thm15="http://schemas.microsoft.com/office/thememl/2012/main" name="eth_praesentation_16zu9_ETH1_d" id="{F9B539DF-8A69-4439-8089-24A40A980317}" vid="{5D9C827C-5BA7-402A-8ABB-C7F0BA4B4DEC}"/>
+      <thm15:themeFamily xmlns:thm15="http://schemas.microsoft.com/office/thememl/2012/main" xmlns="" name="eth_praesentation_16zu9_ETH1_d" id="{F9B539DF-8A69-4439-8089-24A40A980317}" vid="{5D9C827C-5BA7-402A-8ABB-C7F0BA4B4DEC}"/>
     </a:ext>
   </a:extLst>
 </a:theme>
@@ -50991,7 +51094,7 @@
   </a:custClrLst>
   <a:extLst>
     <a:ext uri="{05A4C25C-085E-4340-85A3-A5531E510DB2}">
-      <thm15:themeFamily xmlns:thm15="http://schemas.microsoft.com/office/thememl/2012/main" name="eth_praesentation_16zu9_ETH1_d" id="{F9B539DF-8A69-4439-8089-24A40A980317}" vid="{5D9C827C-5BA7-402A-8ABB-C7F0BA4B4DEC}"/>
+      <thm15:themeFamily xmlns:thm15="http://schemas.microsoft.com/office/thememl/2012/main" xmlns="" name="eth_praesentation_16zu9_ETH1_d" id="{F9B539DF-8A69-4439-8089-24A40A980317}" vid="{5D9C827C-5BA7-402A-8ABB-C7F0BA4B4DEC}"/>
     </a:ext>
   </a:extLst>
 </a:theme>

</xml_diff>